<commit_message>
Updated notes and summaries for course III and IV;
</commit_message>
<xml_diff>
--- a/Part III deep-neural-network/02_optimization-algorithms/01_optimization-algorithms/06_gradient-descent-with-momentum_C2W2L05.pptx
+++ b/Part III deep-neural-network/02_optimization-algorithms/01_optimization-algorithms/06_gradient-descent-with-momentum_C2W2L05.pptx
@@ -117,10 +117,6 @@
 </p:presentation>
 </file>
 
-<file path=ppt/revisionInfo.xml><?xml version="1.0" encoding="utf-8"?>
-<p1510:revInfo xmlns:a="http://schemas.openxmlformats.org/drawingml/2006/main" xmlns:r="http://schemas.openxmlformats.org/officeDocument/2006/relationships" xmlns:p1510="http://schemas.microsoft.com/office/powerpoint/2015/10/main"/>
-</file>
-
 <file path=ppt/ink/ink1.xml><?xml version="1.0" encoding="utf-8"?>
 <inkml:ink xmlns:inkml="http://www.w3.org/2003/InkML">
   <inkml:definitions>
@@ -160,13 +156,13 @@
   <inkml:trace contextRef="#ctx0" brushRef="#br0" timeOffset="7487.0276">5486 5838 0,'-18'-88'16,"36"71"374,-18-1-359,0 0-31,0 1 16,17-1-16,-17 0 16,18 1-16,-18-1 31,0 1-31,18-19 16,-18 19-16,17-19 15,-17 19-15,0-1 0,18 0 16,0-34-16,-18 34 15,17-17-15,-17 17 0,18-17 16,-1-18 0,-17 35-16,18 0 0,-18-17 15,18 0-15,-1 0 0,1-36 16,0 36-16,-18 0 16,17-1-16,-17 1 0,18 17 15,0-52 1,-18 35-16,17-18 15,1 17-15,-1-34 16,1 34-16,0 1 16,-18 18-16,17-36 15,1 17-15,-18 1 16,18 17-16,-18-17 16,0 18-16,0-1 0,0 0 15,17 1-15,-17-19 16,0 19-16,18-1 15,-18-17 1,18 35-16,-18-18 0,0 1 16,17-1 15,-17 0-15,0 1-1,0-1 1</inkml:trace>
   <inkml:trace contextRef="#ctx0" brushRef="#br0" timeOffset="8287.6209">5803 4180 0,'0'0'0,"-17"18"0,34-36 31,1 1-15,-1-1-16,1 1 15,0-19-15,-1 19 0,19-19 16,-19 19-16,1-19 15,0 36-15,-1-17 16,-17-1-16,18 18 16,-18-18-16,18 1 31,-18-1-31,17 1 16,1 17-16,-1-18 31,1 18-16,-18-18 17,0 36 186,0 0-202,-18-1 0,18 1-16,0 17 15,18 0-15,-18-17 16,0 0-16,18 17 16,-18-17-16,0 17 0,0-17 15,17-18-15,-17 35 16,18-35-16,-18 17 15,18 1-15,-1-18 16</inkml:trace>
   <inkml:trace contextRef="#ctx0" brushRef="#br0" timeOffset="9237.4817">6068 3881 0,'0'0'16,"-18"0"31,18 17-16,0 1-31,-17-18 16,34 0-1,1 0 17,-18-35-32,0 17 15,0-17-15,0 17 16,0 0-16,0 1 15,-18-1-15,1 18 16,-1 18 0,18 17-1,0-17-15,0 35 0,0-36 16,35 1 0,-17-18-16,-1 17 0,1-17 15,0-17 1,-1 17-16,-17-18 0,18-17 15,-18 0-15,-18-1 16,18 19-16,-35-1 16,17 18-16,-17 18 15,18-18-15,-1 35 16,18-17-16,0 17 16,18-35-16,-1 18 15,1-18-15,17 0 16,-17 0-1,-18-18 1,17 0-16,-34 1 16,-1-1-16,0 18 15,1-18-15,-1 18 16,-17 18-16,17 0 16,18-1-16,0 1 15,36 0-15,-19-18 16,1 17-16</inkml:trace>
-  <inkml:trace contextRef="#ctx0" brushRef="#br0" timeOffset="12691.4641">6085 3775 0,'-17'0'0,"17"17"15,0 1-15,17-18 32,1 0-1,-18-18 0,-18 1-15,1-1-1,-1 18 1,18 18 0,0-1-1,18-17 1,-18 18-16,35-18 15,-35-18-15,35 1 16,-35-1-16,18-17 16,-18 17-16,-18 1 31,1 17-31,-1 0 0,0 17 16,1 1-16,-1-1 15,18 1-15,0 0 16,18-18-1,17 0 1,-17 0-16,-1-18 16,-17 0-16,18 18 15,-18-17-15,-18 17 16,1 17-16</inkml:trace>
+  <inkml:trace contextRef="#ctx0" brushRef="#br0" timeOffset="12691.464">6085 3775 0,'-17'0'0,"17"17"15,0 1-15,17-18 32,1 0-1,-18-18 0,-18 1-15,1-1-1,-1 18 1,18 18 0,0-1-1,18-17 1,-18 18-16,35-18 15,-35-18-15,35 1 16,-35-1-16,18-17 16,-18 17-16,-18 1 31,1 17-31,-1 0 0,0 17 16,1 1-16,-1-1 15,18 1-15,0 0 16,18-18-1,17 0 1,-17 0-16,-1-18 16,-17 0-16,18 18 15,-18-17-15,-18 17 16,1 17-16</inkml:trace>
   <inkml:trace contextRef="#ctx0" brushRef="#br0" timeOffset="14588.7566">6138 3810 0,'0'-18'0,"0"1"15,0-1-15,18 18 16,-18-18-16,0 36 31,0 0 1,0-1-17,0 1 1,0 0 15,0-1 47,0 1 125,0 0-187,0-1-16,18-17 16,-18 35-16,0-17 15,0 17 1,0-17-16,17 17 15,-17-17 1,18 17 0,-18-17-16,0 0 0,18 17 15,-18 0-15,0-17 16,17 35-16,-17-18 16,0-17-16,0 17 15,18-18-15,-18 54 16,0-53-16,0 17 0,17 18 15,-17-18-15,0 0 16,18 18-16,-18-17 16,0 17-16,0-18 15,18 0-15,-18 18 16,0-18-16,17 1 16,-17-1-16,0 0 15,0-17-15,18 35 16,-18-36-16,18 19 15,-18-19-15,0 18 16,17-17-16,-17 17 16,18-17-16,-18 17 15,0-17 1,18 0-16,-18-1 16,0 1-1,17-18 1,-17 18-1,0-1 17,18-17-32,-18 18 15,0-1 79,0 1-63,0 0-15,0-1-16,17-17 16,-17 18-16,0 0 46,18-1 33,-18 1-64,0 0 1,18-18-1,-18 17 1,-18-34 62</inkml:trace>
   <inkml:trace contextRef="#ctx0" brushRef="#br0" timeOffset="14899.1576">6297 5468 0,'-18'-18'16,"36"54"-1,0-1-15,-1-17 16,1 17-16,35 18 16,-18-36-16,-17 1 15,17 0-15,-17-18 16,17-18-16,-17 18 16,-18-53-16,17 36 15,-17-19 1,0 1-16,0 17 15,18 18-15,-18 18 32</inkml:trace>
   <inkml:trace contextRef="#ctx0" brushRef="#br0" timeOffset="15438.615">6473 5574 0,'0'0'15,"-17"18"-15,-1-18 16,36 17 0,-1 1-1,1-18 1,0 0-16,-1-18 0,1 1 15,0-19 1,-18 19 0,-18-1-16,18 0 0,-18 18 15,1-17-15,-1 17 0,0 17 16,18 1 0,-17 17-16,17-17 15,17 0 1,1-1-16,17-17 15,-35-17-15,18 17 0,0-18 16,-18 0-16,-18 1 16,18-1-16,-35 18 15,17-18-15,0 18 0,1 0 16,-18 18-16,-1 0 16,19-1-16,17 1 15,0 0-15,53-18 16,-36 0-16,18-18 15,18-17-15,-35 35 16,0-18-16,-18 0 0,17 18 16,-34-17-1,-1 17-15,-17 0 16</inkml:trace>
   <inkml:trace contextRef="#ctx0" brushRef="#br0" timeOffset="16077.5764">6456 5627 0,'0'0'0,"0"-18"31,17 18-16,-17-17-15,0-1 0,18 0 16,-18-17-16,18-18 16,-1 18-1,1-36-15,-18 18 16,18 18-16,-1-36 0,36-34 16,-35 34-16,35-70 15,-18 70 1,18-52-16,-35 52 15,-1-70-15,-17 71 16,18-54-16,-18 71 16,0 18-16,0-18 0,0 36 15,18-19-15,-18 1 16,17 0-16,-17 17 16,18 0-16,-1-17 15,-17 17-15,18 1 0,-18-1 16,18 1-16,-18-1 15,0 0 1</inkml:trace>
-  <inkml:trace contextRef="#ctx0" brushRef="#br0" timeOffset="16662.8902">6950 3810 0,'0'0'0,"0"-18"16,-18 1 0,0 34 31,18 1-47,0 0 15,0-1 1,-17-17 31,17-17-32,-18 17 1,18 17 0,0 1 15,0-36 16,-17 18-32,-1 0 1,0 0 0,18 18-1,0 0-15,18-18 16,0 17-16,-1-17 0,18-17 15,-17-1-15,0 0 16,-18 1 0,0-1-1,-18 18 1,0 0-16,1 0 16,17 18-1,17-18 16,1 17-31,0-17 16,-1 0 0</inkml:trace>
-  <inkml:trace contextRef="#ctx0" brushRef="#br0" timeOffset="17106.3296">6950 3828 0,'0'17'78,"0"1"-62,17 0-1,-17 17-15,0-18 16,0 19-16,18 17 15,-18-36-15,0 19 16,18 17-16,-18-18 0,0 18 0,17 53 16,-17-54-1,18 1-15,-18-17 0,18 17 16,-1 52-16,-17-69 16,18 17-16,-18 0 0,0-1 15,17-16-15,1 70 16,-18-54-16,18 37 15,-1-54-15,1 35 16,0-34-16,-18-1 16,17 36-16,1-36 15,0 35-15,-18-52 16,17 35 0,-17-35-16,18-1 15,0-17-15,-18-35 16</inkml:trace>
+  <inkml:trace contextRef="#ctx0" brushRef="#br0" timeOffset="16662.8901">6950 3810 0,'0'0'0,"0"-18"16,-18 1 0,0 34 31,18 1-47,0 0 15,0-1 1,-17-17 31,17-17-32,-18 17 1,18 17 0,0 1 15,0-36 16,-17 18-32,-1 0 1,0 0 0,18 18-1,0 0-15,18-18 16,0 17-16,-1-17 0,18-17 15,-17-1-15,0 0 16,-18 1 0,0-1-1,-18 18 1,0 0-16,1 0 16,17 18-1,17-18 16,1 17-31,0-17 16,-1 0 0</inkml:trace>
+  <inkml:trace contextRef="#ctx0" brushRef="#br0" timeOffset="17106.3295">6950 3828 0,'0'17'78,"0"1"-62,17 0-1,-17 17-15,0-18 16,0 19-16,18 17 15,-18-36-15,0 19 16,18 17-16,-18-18 0,0 18 0,17 53 16,-17-54-1,18 1-15,-18-17 0,18 17 16,-1 52-16,-17-69 16,18 17-16,-18 0 0,0-1 15,17-16-15,1 70 16,-18-54-16,18 37 15,-1-54-15,1 35 16,0-34-16,-18-1 16,17 36-16,1-36 15,0 35-15,-18-52 16,17 35 0,-17-35-16,18-1 15,0-17-15,-18-35 16</inkml:trace>
   <inkml:trace contextRef="#ctx0" brushRef="#br0" timeOffset="18624.8761">7303 5574 0,'17'0'0,"1"-18"78,-1-35-62,-17 18-16,36-35 15,-19 17-15,1-53 16,0 53-16,-1 0 16,1-53-16,0 53 15,-1 0-15,36-123 16,-18 70-1,-17 0 1,0 18 0,-1 53-16,-17-36 15,0 36-15,0 0 0,18-18 16,-18 35-16,0-17 16,18 35-16,-18-18 15,0 1 1,0-1 31,17 18-32,-17-18 1,0 1-16,18-1 16,-18 0-16,0 1 0,17-1 15,-17 0 1,18 18-1,-18-17 1,-18 17 78,18 17-79</inkml:trace>
   <inkml:trace contextRef="#ctx0" brushRef="#br0" timeOffset="23491.0339">7743 3951 0,'0'-18'16,"0"1"-16,0-1 15,18 18-15,-18 18 47,18 17-31,-18-17-16,0-1 16,17 36-16,1-35 15,-18 17-15,35 36 16,-35-36-16,18 53 15,-18-35-15,18 53 16,-18-53-16,0 35 16,17-35-16,1 35 15,-18-52-15,18 34 16,-1-35-16,1 36 16,-18-53-16,17 34 15,1-34-15,-18 0 16,0-1-16,0 1 15,18 17-15,-18-17 16,0 17 0,0-17-16,0-1 15,0 1 32,0 0-31,0-1-1,0 1 1,0 0 0,-18-18-16,18 17 15,0 1 17,0 0 30,18-18 32,-18-18-63,0 0 0,0 36 47,0 0-62,0-1 0,0 1-1,0 0 1,0-1 0,0 1-1,-18-18 1,36 0 15,-1-18-15,-17 1-16,0-1 15,0-17-15,18 17 16,-18 0-16,0-17 16,18-18-1,-18 18-15,17 17 0,-17-17 16,18-36-16,0 36 15,-1-35-15,1 17 16,-18-53-16,17 71 16,-17-71-1,0 53-15,18-18 16,-18 36-16,0-18 16,0 35-16,0 1 0,0-36 15,18 18 1,-18-1-16,17 19 15,-17-36-15,18 35 16,-18 0-16,0 1 0,0-1 16,0 1 46,0-1-46,18 18-1,-18-18 48,17 18-47,-17-17-1,0-1 16,0 0-15,0 1 0,18-1-1,-18 36 220,0-1-220,0 1-15,0 0 16,0-1 0,0 1-16,0 0 0,0 17 15,0 0 1,18-17-16,-18-1 15,0 36-15,17-17 16,-17-1 0,18-18-16,-1 19 15,-17-19-15,18 19 16,0-1 0,-18 0-16,17-17 15,-17 17-15,0-17 0,18 35 16,-18-36-16,18 36 15,-1-17-15,-17-1 16,18 0-16,0 0 16,-18-17-16,17 0 15,1 17 1,-18-17-16,18-18 0,-18 17 16,0 1-16,0-1 15,17-17 1,-17 18-1,0 0-15,0-1 16,18-17 15,-18 18-31,0 0 16,0-1 93,0 1-77,0 0-17,0-1 1,0 1-1,0-1-15,17-17 16,-17-17 93,18-18-93,-18 17-16,18-17 16,-18-1-16,0 19 0,17-19 15,-17-16 1,18 16-16,-18 1 0,0 0 16,18-1-16,-18 1 0,17-35 15,-17 34-15,0-34 16,0 34-16,0 19 15,18-36 1,-18 18-16,0-18 16,18 35-16,-18-52 15,0 52-15,17-35 16,1 0 0,-18 35-16,0 1 15,0-1-15,0 1 16,0-1 15,0 0-15,0 1-1,0-1 48,17 18-48,-17-18 1,0 36 93,0 0-93,18-1 0,-18 1-16,0 17 15,0 0 1,0 18-16,18-35 16,-1 53-16,-17-36 15,0-18-15,18 19 16,-18-1-16,18 18 15,-1-18-15,1 18 16,-18-18-16,18 18 16,-1-35-16,1 35 15,-18-35-15,17 17 16,-17-18-16,18 19 16,-18-19-16,0 1 15,18 17-15,-18-17 16,0 0-16,17-1 15,-17 18-15,0-17 16,18 0-16,-18-1 16,0 1-16,0 0 0,18-1 15,-18 1-15,0 0 16,17-1-16,-17 1 16,0-1-1,0 1-15,0 0 16,18-1-1,-18 1-15,0 0 16,0-1-16,18 1 16,-18 0 31,0-1 31,0-34-31,17-1-32,-17-17 1,0 17-16,18-17 15,-18-1-15,18-34 16,-18 35-16,0-71 16,17 53-16,-17-53 15,18 71-15,-18-53 16,17 52-16,-17-34 16,18 52-16,-18-52 15,0 52-15,18-35 16,-18 35-16,17-17 15,-17-18-15,0 36 16,18-1-16,-18 0 0,0 1 16,0-1 31,18 18-1,-18 18 33,0-1-64,17 1-15,-17 17 16,18-17-16,-18-1 15,18 1-15,-18 17 0,17 1 0,-17-19 16,18 54 0,-1-36-16,-17 0 0,18 1 15,-18 52-15,18-35 16,-18-18-16,17 53 16,1-70-16,-18 17 0,18 0 15,-1 1 1,1-19-16,-18 1 0,18 0 15,-1-1-15,-17 1 16,18-18 0,-18 18-16,0-1 15,17-17 1,-17 18-16,0-36 62,0 1-46,0-1-16,0-17 16,0-1-16,18-17 15,-18 18-15,0-18 16,18 0-16,-18 18 0,17-71 16,1 53-1,-18 18-15,18-36 16,-1 19-16,1 16 0,0-34 15,-18 34-15,17 1 16,-17 0-16,0 17 16,18 18-1,-18-17 48,0-1-32,0 0 32,0 36 30,0 0-77,0-1-16,0 19 0,0 16 16,18 37-16,-1-36 15,1 52 1,-1 19-16,-17-71 0,18-18 15,0 18-15,-1-18 0,-17 1 16,36 34 0,-36-35-16,17 1 0,-17 17 15,18-36-15,-18 1 16,0-1-16,18 1 16,-36-36 15</inkml:trace>
   <inkml:trace contextRef="#ctx0" brushRef="#br0" timeOffset="26749.945">10054 5274 0,'0'-18'15,"0"1"1,-17 17 0,17-18-1,-18 18-15,0 18 63,18-36 30,18 18-77,0 0 0,-18-18-1,17 18-15,-17-17 16,0-1 0,18 1-1,-1-1-15,1-35 16,0 35-16,35-52 15,-36 35-15,19-36 16,-19 18-16,18-35 16,-17 35-16,0 0 15,-1 18-15,1-18 0,0-18 16,-18 36-16,0 0 16,17-1-16,-17 19 15,0-1-15,0 1 16,18 17-16,0 0 62,-18 17-30,-18 1-17,18 17 1,18-17-1,-18-1-15,0 1 0,17 35 16,-17-35-16,0 17 16,18 0-16,0 36 15,-18-18-15,17-18 0,-17 18 16,18 17-16,-1-34 16,1-1-16,-18-17 0,18 17 15,-18-18-15,17 1 16,-17-36 78,0 1-63,0-1-31,18 1 15,-18-1 1,0 0-16,0 1 16,0-1-1,18 0-15,-18 1 16,0-1-16,17-35 16,-17 36-16,18-36 15,0 17-15,-18 1 16,17-18-1,1 0-15,-18 18 16,17-18-16,1-18 16,-18 54-16,18-36 15,-18 35 1,17 18 31,-17 18-32,18 0 1,-18 17-16,18 35 16,-1-34-16,1 34 15,0-35-15,17 36 16,-18-36-16,1 1 16,-18-1-16,18-17 0,-1-1 15,1 36 1,-18-35-16,18-1 0,-18 1 15,17 0-15,1-36 79,-18 0-64,0 1 1,0-1-16,0 0 0,18-17 15,-18 18-15,17-36 16,-17 35-16,18-17 16,-18-1-16,0 1 15,18 17-15,-18-34 16,0 34-16,0-35 16,17 35-1,-17 1-15,0-1 63,0 36-16,0-1-32,18 36 1,-1-35-16,-17 17 0,18-17 15,0 17-15,-1 0 0,1 1 16,17 34 0,-17-34-16,0-1 15,-1-18-15,-17 1 0,18 0 0,-18-1 16,17-17-16,-17 18 16,0-36 15,0 1-16,0-1-15,0-17 16,18 0-16,-18 17 16,0 0-16,0-17 0,0 17 15,18-35-15,-18 36 16,0-19 0,17 19-16,-17-18 15,0 52 32,0 1-31,0-1-16,0 1 0,18 17 15,-18-17-15,18 35 16,-1-18-16,1 18 16,0-35-16,-1 17 15,1-17-15,-1-18 16,1 0-1,-18-18 1,0 0 0,18-17-1,-18 0-15,0 17 0,0 1 0,0-19 16,0 1 0,0 0-16,0-1 15,0 19-15,17 17 16,-17 17-1,18 19 1,-18-19 0,18 19-16,-1-1 15,-17 0-15,18-17 0,-18 0 16,35 17-16,-17-18 16,0-17-1,-1-17 1,-17-1-1,18-17-15,-18 17 0,0-35 16,0 18-16,17 0 16,-17 17-16,0 0 15,18 18 1,-18-17-16,0 34 16,0 1-1,18 0-15,-18 17 16,0-17-16,17 17 0,-17-17 0,18 35 15,0-36 1,-1-17-16,1 18 16,0-1-16,-1-17 0,-17-17 15,18 17-15,-18-35 16,17 17-16,-17-17 16,0 17-16,18-17 15,-18 17-15,0 36 47,18-1-31,-18 1-16,17-18 0,1 18 15,0-18 1,-1 0 0,-17-18-1,0 0 1,18 1-16,-18-1 15,0 0-15</inkml:trace>
@@ -174,34 +170,34 @@
   <inkml:trace contextRef="#ctx0" brushRef="#br0" timeOffset="29858.4927">14041 4745 0,'17'0'16,"1"-18"0,-1 18-16,19-17 15,-19 17-15,19 17 16</inkml:trace>
   <inkml:trace contextRef="#ctx0" brushRef="#br1" timeOffset="45280.0735">5450 5944 0,'0'-17'218,"18"17"-218,-18-18 16,0 0 15,18 18-15,-18-17-16,0-1 15,17 18-15,-17-35 16,0 17-16,18-17 16,-18 17-16,0-17 15,18 0-15,-18 17 16,17-35 0,-17 18-16,18 17 0,-18-17 15,18-36-15,-1 36 16,1-35-16,-18 34 15,17-52-15,1 53 16,17-53 0,-17 35-16,0 17 15,-1-69-15,19 16 16,-36 37-16,17-1 16,1 0-16,-18 0 0,17-53 15,1 53-15,-18 0 16,18 18-16,-1-71 15,-17 71-15,36-71 16,-19 71-16,-17-18 0,36-53 16,-19 53-16,1-53 15,0 53-15,17-53 16,-18 36 0,19-18-16,-36 35 0,35-36 15,-35 54 1,18-53-1,-1 35-15,-17 0 0,18-17 0,0-36 16,-18 53 0,17-18-16,-17 54 15,18-1-15,-18 0 0,0 1 16,0-1-16,0 0 16,17 1-16,-17-1 15,0 1-15,18-1 16,-18 0-16,0-17 15,0 17 1,0 1-16,-18 34 16</inkml:trace>
   <inkml:trace contextRef="#ctx0" brushRef="#br1" timeOffset="45523.9823">6121 2663 0,'0'0'15,"0"-17"-15,0-1 0,0 1 0,17-19 16,1-17 0,0 36-16,17-19 15,-17 19-15,17-18 16,-35 17-16,17 18 16,1 18-1,-18-1-15,0 1 0,0-1 16,0 1-16,0 0 15,0-1-15,0 19 16,0-19-16,18 19 16</inkml:trace>
-  <inkml:trace contextRef="#ctx0" brushRef="#br1" timeOffset="47125.6952">6297 2558 0,'0'17'78,"0"1"-47,0 0-15,0-1-1,18-17-15,-18 18 16,0-1-16,0 19 16,17-19-16,-17 19 15,0-19-15,0 1 16,18 17-16,-18-17 15,0 17-15,18-17 0,-18 52 16,0-17-16,17-17 0,-17 34 16,18-35-16,-18 54 15,0-54 1,18 53-16,-18-53 16,17 71-16,-17-53 15,0-18-15,18 36 0,-18-18 16,0 0-16,17 53 15,-17-54-15,0 1 16,0 53-16,0-35 16,18-18-16,-18 0 15,0 17-15,0 1 0,18-18 0,-18 70 16,0-52-16,0-1 16,0 1-16,17 70 15,-17-71-15,18 54 16,0-54-16,-1 54 15,1-71-15,0 0 16,-18-18-16,17 18 0,1 0 16,-18 0-16,18 0 0,-1-18 15,-17 53-15,18-35 16,-18 0-16,17-18 16,-17 54-16,18-54 15,0 35-15,-18-34 16,0-1-16,17 18 15,-17-18-15,18 0 16,0 36-16,-18-36 16,0-17-16,17 17 0,-17 0 15,0 1-15,18-19 16,-18 19-16,0-19 0,18 36 16,-18-18-16,17 18 15,-17-35-15,18 17 16,-1 1-16,-17-19 15,0 18-15,18 1 16,0-19 0,-18 1-1,17 0-15,1-18 32,-18 17-17,0 1-15,0 0 16,18-18-1,-18 17-15,0 1 16,17-1-16,-17 1 16,0 0-1,0-1-15,18 19 16,-18-19-16,0 1 16,18-18-1,-18 18 1,0-1-1,0 1-15,0 0 16,17-1-16,-17 18 16,0-17-16,0 17 15,18-35 1,-18 18-16,0-36 16,0 1-1</inkml:trace>
-  <inkml:trace contextRef="#ctx0" brushRef="#br1" timeOffset="47476.3354">6879 7373 0,'18'0'16,"-18"18"-16,17-1 0,19 1 16,-1 53-16,0-36 15,-17-18-15,0 19 0,-1-1 16,1-17-16,-1-1 15,19 1-15,-19-36 16,1 1 0,-18-19-16,18-17 0,-1 18 15,-17-18-15,18 0 0,17-52 16,-17 52-16,0 0 16,-1 53-16,-17-18 15,0 36-15</inkml:trace>
-  <inkml:trace contextRef="#ctx0" brushRef="#br0" timeOffset="81438.4436">27781 5697 0,'0'18'0,"0"17"15,-17 1-15,17 52 16,0-18-16,0-17 16,0 88-1,0-70-15,0 88 16,0-89-16,0 71 15,0-70-15,17 17 16,-17-35-16,0-18 16,0-17-16,0 0 15,0-1-15,0-34 16,0-1-16</inkml:trace>
-  <inkml:trace contextRef="#ctx0" brushRef="#br0" timeOffset="81905.9462">27464 6121 0,'17'0'15,"1"-18"-15,0 0 16,35-34-16,-36 16 15,36-34 1,-35 34-16,17-17 0,0-35 16,1 53-16,-1-53 15,-35 35-15,18 0 16,-1 35-16,-17 36 31,18 17-31,-18 1 16,17-1-16,1 18 0,17 17 15,-17-52-15,17 35 16,-17-36-16,0 1 16,-1 0-16</inkml:trace>
+  <inkml:trace contextRef="#ctx0" brushRef="#br1" timeOffset="47125.6951">6297 2558 0,'0'17'78,"0"1"-47,0 0-15,0-1-1,18-17-15,-18 18 16,0-1-16,0 19 16,17-19-16,-17 19 15,0-19-15,0 1 16,18 17-16,-18-17 15,0 17-15,18-17 0,-18 52 16,0-17-16,17-17 0,-17 34 16,18-35-16,-18 54 15,0-54 1,18 53-16,-18-53 16,17 71-16,-17-53 15,0-18-15,18 36 0,-18-18 16,0 0-16,17 53 15,-17-54-15,0 1 16,0 53-16,0-35 16,18-18-16,-18 0 15,0 17-15,0 1 0,18-18 0,-18 70 16,0-52-16,0-1 16,0 1-16,17 70 15,-17-71-15,18 54 16,0-54-16,-1 54 15,1-71-15,0 0 16,-18-18-16,17 18 0,1 0 16,-18 0-16,18 0 0,-1-18 15,-17 53-15,18-35 16,-18 0-16,17-18 16,-17 54-16,18-54 15,0 35-15,-18-34 16,0-1-16,17 18 15,-17-18-15,18 0 16,0 36-16,-18-36 16,0-17-16,17 17 0,-17 0 15,0 1-15,18-19 16,-18 19-16,0-19 0,18 36 16,-18-18-16,17 18 15,-17-35-15,18 17 16,-1 1-16,-17-19 15,0 18-15,18 1 16,0-19 0,-18 1-1,17 0-15,1-18 32,-18 17-17,0 1-15,0 0 16,18-18-1,-18 17-15,0 1 16,17-1-16,-17 1 16,0 0-1,0-1-15,18 19 16,-18-19-16,0 1 16,18-18-1,-18 18 1,0-1-1,0 1-15,0 0 16,17-1-16,-17 18 16,0-17-16,0 17 15,18-35 1,-18 18-16,0-36 16,0 1-1</inkml:trace>
+  <inkml:trace contextRef="#ctx0" brushRef="#br1" timeOffset="47476.3353">6879 7373 0,'18'0'16,"-18"18"-16,17-1 0,19 1 16,-1 53-16,0-36 15,-17-18-15,0 19 0,-1-1 16,1-17-16,-1-1 15,19 1-15,-19-36 16,1 1 0,-18-19-16,18-17 0,-1 18 15,-17-18-15,18 0 0,17-52 16,-17 52-16,0 0 16,-1 53-16,-17-18 15,0 36-15</inkml:trace>
+  <inkml:trace contextRef="#ctx0" brushRef="#br0" timeOffset="81438.4435">27781 5697 0,'0'18'0,"0"17"15,-17 1-15,17 52 16,0-18-16,0-17 16,0 88-1,0-70-15,0 88 16,0-89-16,0 71 15,0-70-15,17 17 16,-17-35-16,0-18 16,0-17-16,0 0 15,0-1-15,0-34 16,0-1-16</inkml:trace>
+  <inkml:trace contextRef="#ctx0" brushRef="#br0" timeOffset="81905.9461">27464 6121 0,'17'0'15,"1"-18"-15,0 0 16,35-34-16,-36 16 15,36-34 1,-35 34-16,17-17 0,0-35 16,1 53-16,-1-53 15,-35 35-15,18 0 16,-1 35-16,-17 36 31,18 17-31,-18 1 16,17-1-16,1 18 0,17 17 15,-17-52-15,17 35 16,-17-36-16,0 1 16,-1 0-16</inkml:trace>
   <inkml:trace contextRef="#ctx0" brushRef="#br0" timeOffset="83513.019">28646 5997 0,'-18'-17'16,"-17"17"-1,17 0-15,-35 0 16,35 17 0,1-17-16,17 18 0,-35 0 15,35-1 1,17 18-16,1-17 15,35 35-15,-18-35 16,0-1-16,36 1 16,-54 0-16,19 17 15,-36-18-15,-18 1 16,18 0-16,-53-18 16,36 0-16,-36 0 15,35 0 1,-17-18-16,35 0 15,-18 1-15,18-1 16</inkml:trace>
   <inkml:trace contextRef="#ctx0" brushRef="#br0" timeOffset="83819.1699">28875 5627 0,'18'17'16,"-18"1"-1,0 17-15,17 18 16,-17 0-16,0 35 15,0-35-15,0 0 16,0 53-16,0-53 16,0 18-16,18-54 15,-18 1-15,17 17 16,1-35-16,0 0 16</inkml:trace>
   <inkml:trace contextRef="#ctx0" brushRef="#br0" timeOffset="84626.5237">29228 6103 0,'-18'0'16,"0"0"-16,1 18 15,-1-1-15,18 36 16,0-35-16,35 35 16,-35-36-16,36 1 15,-19 0-15,1-1 16,17-17-16,-17 0 16,-1-17-1,-34-1-15,17 0 16,-18-17-16,1 18 15,-1-19-15,0 19 0,1-1 16,-1 0 0,36 18 15,17 0-31,-17 0 16,17 0-1,-18 0-15,1 0 16,0 0-16,-1 0 15,-17 18 32,0 17-31,0-17-16,18 0 16,-18-1-16,18 1 15,-1-1-15,1-17 16,0 0-16,-18-17 15,17-1 1,-17 1 0,0-1-16,0 0 15,18 1-15,-18 34 32,18 1-32,-1-18 15,1 18 1,-1-1-16,19 1 15,-19-18-15,1 0 16,0 0-16,-18-18 16,17-17-1,-17 17-15,0-17 16,-17 0 0,17-1-16,-18-16 15,18 34-15,0 0 0,-18 18 16,18 18-1</inkml:trace>
-  <inkml:trace contextRef="#ctx0" brushRef="#br0" timeOffset="85932.4028">29863 6191 0,'17'0'32,"19"-17"-32,-36-1 15,17 0-15,1 18 16,-1-17-16,-17-1 0,0 0 16,-17 1-1,-1 17-15,-17 0 16,0 17-16,-1 1 15,36 0-15,-17 17 16,17-17-16,17 17 0,1-17 16,17 17-1,1-35-15,-1 0 16,0 17-16,18-17 0,-18-17 16,-17 17-16,17-18 0,-35 1 0,18-19 15,-18 19-15,0-19 31,-18 36-31,18-17 16,18 17-16,0 0 16,34-18-1,-16 18-15,-1 0 0,-17 0 0,17 0 16</inkml:trace>
-  <inkml:trace contextRef="#ctx0" brushRef="#br0" timeOffset="86237.7942">30762 5609 0,'0'35'16,"0"1"-16,18-1 0,-18 0 15,18 71 1,-18-53-16,17 53 16,1-36-16,-18-34 15,17 17-15,1-36 16,0 1-16</inkml:trace>
+  <inkml:trace contextRef="#ctx0" brushRef="#br0" timeOffset="85932.4027">29863 6191 0,'17'0'32,"19"-17"-32,-36-1 15,17 0-15,1 18 16,-1-17-16,-17-1 0,0 0 16,-17 1-1,-1 17-15,-17 0 16,0 17-16,-1 1 15,36 0-15,-17 17 16,17-17-16,17 17 0,1-17 16,17 17-1,1-35-15,-1 0 16,0 17-16,18-17 0,-18-17 16,-17 17-16,17-18 0,-35 1 0,18-19 15,-18 19-15,0-19 31,-18 36-31,18-17 16,18 17-16,0 0 16,34-18-1,-16 18-15,-1 0 0,-17 0 0,17 0 16</inkml:trace>
+  <inkml:trace contextRef="#ctx0" brushRef="#br0" timeOffset="86237.7941">30762 5609 0,'0'35'16,"0"1"-16,18-1 0,-18 0 15,18 71 1,-18-53-16,17 53 16,1-36-16,-18-34 15,17 17-15,1-36 16,0 1-16</inkml:trace>
   <inkml:trace contextRef="#ctx0" brushRef="#br0" timeOffset="86955.2019">30992 6174 0,'35'0'16,"-18"0"-1,1-18-15,53-17 16,-54 17-16,1 0 0,0-17 16,-1 35-16,-34-35 15,-1 17-15,0 18 16,-17 0 0,17 0-16,-17 18 15,17 0-15,1 17 16,17-18-16,0 1 0,35 0 15,0-1-15,36 1 16,-36-18 0,18 0-16,-18 0 15,1-18-15,-19 18 16,1-17-16,0-1 16,-18 0-16,-18 1 15,0 17 1,1 0-16,-1 17 15,0 1-15,1 0 0,17-1 16,0 19-16,17 17 16,1-53-16,17 35 15,1-35-15,-1 0 16,0 0 0,-17-18-16,-18-17 15,0 17-15,0 1 16,-18-19-1,1 19-15,17 34 32,17 1-17,1-18-15,-1 18 16,19-1-16,-19-17 16,1 0-16,-18-17 15,-18-1 1,18 0-1,-17-17-15,17 17 16,0-17-16,17 18 16,1-19-1,0 36-15,-1 0 16,19 0-16,-19 0 16,1 0-16</inkml:trace>
   <inkml:trace contextRef="#ctx0" brushRef="#br0" timeOffset="87237.9804">31662 6174 0,'0'17'15,"0"-34"-15,0 52 0,17-17 0,-17-1 16,18-17-16,-18-17 16,0-1-1,0-17 1,0-1-16,0-17 15,0 36-15,18-1 16,-1 1-16,1 17 16,0 0-16,-1 0 15,1 35 1,-18-18-16,0 1 0,18 17 16,-18-17-16,0 0 15,0-1-15,17 1 16</inkml:trace>
   <inkml:trace contextRef="#ctx0" brushRef="#br0" timeOffset="87400.7357">31909 6068 0,'17'35'16,"-17"-17"-1,0-1-15,18 1 16,-18 0-16,0-1 0,18-17 16</inkml:trace>
   <inkml:trace contextRef="#ctx0" brushRef="#br0" timeOffset="87868.1354">31979 5980 0,'0'35'16,"0"-70"-16,0 88 0,0-36 16,0 1-1,0-1-15,18-17 16,0 18-1,-18 0-15,17-18 0,1 0 16,0 17 0,-1-17-1,-17 18-15,18 35 16,-1-35-16,1 34 16,-18-16-16,18 17 15,-18-18-15,0 0 16,-18-52 15,18-1-15,0 0-16,-18-17 0,18-18 15,18 18-15,17-36 16,1 54-16,69-36 16,-34 35-16,52 0 15,-70 1-15,18 17 16,-36 0-16</inkml:trace>
-  <inkml:trace contextRef="#ctx0" brushRef="#br0" timeOffset="89685.7902">27428 6685 0,'36'35'16,"-19"-17"-16,1 17 16,0-17-16,17 17 15,-17-17-15,-1 0 0,1-18 16,35 0-16,-36 0 15,54-36 1,-53 19-16,52-19 16,-35 1-16,-17 17 0,0 1 15,17-36-15,-35 35 16,18 1-16</inkml:trace>
+  <inkml:trace contextRef="#ctx0" brushRef="#br0" timeOffset="89685.7901">27428 6685 0,'36'35'16,"-19"-17"-16,1 17 16,0-17-16,17 17 15,-17-17-15,-1 0 0,1-18 16,35 0-16,-36 0 15,54-36 1,-53 19-16,52-19 16,-35 1-16,-17 17 0,0 1 15,17-36-15,-35 35 16,18 1-16</inkml:trace>
   <inkml:trace contextRef="#ctx0" brushRef="#br0" timeOffset="91342.9506">26793 7673 0,'0'18'0,"18"-18"16,0 17 0,35-17-16,-18 0 15,18 18-15,53-1 16,-53 1-16,70 0 15,-70-1-15,88 19 16,-53-19-16,53-17 16,-88 0-16,53 0 15,-71 0-15,1 0 16,-19 0-16,-17-17 16,-17 17-1</inkml:trace>
   <inkml:trace contextRef="#ctx0" brushRef="#br0" timeOffset="91622.0258">27817 7602 0,'35'18'16,"0"-18"-16,0 18 0,54-1 15,-37 1-15,37 35 16,-19 0 0,-52-36-16,0 36 15,-18-35-15,-36 35 16,19-53-16,-19 18 16,1-1-16,0-17 15,-18 18-15,18-18 0,-1 0 16,19 0-1,-1 0-15</inkml:trace>
   <inkml:trace contextRef="#ctx0" brushRef="#br0" timeOffset="91983.1301">26988 7567 0,'0'0'0,"-18"0"15,0 0-15,-35 18 16,18-1-16,0 1 15,-18 0-15,-35 35 16,52-36-16,1 1 0,0-1 16,17 1-16,1 0 0,-1-1 15,18 1-15,18 35 16,-1-35-16,71 52 16,-17-35-16,52 18 15,-17 0 1,-70-35-16</inkml:trace>
   <inkml:trace contextRef="#ctx0" brushRef="#br0" timeOffset="93195.0808">28945 7602 0,'0'-70'15,"0"140"-15,0-175 0,-17 16 0,-1 54 16,-35-18 0,18 36-16,0 17 0,-18 17 15,0 36 1,35-18-16,18 71 16,0-53-16,35 71 15,-17-72-15,0 1 16,-1 0-16,19 0 15,-19-17-15,1-19 0,-18 1 16,0-36 15,-18 1-31,18-1 16,-17 0-16,17 1 16,17 17-16,1-18 15,0 18-15,-1 0 0,54 0 16,-18 0-16,35-18 15,-53 18-15,0 0 16,18-17-16,-35 17 16,-18 17-1,-35 1-15,17 0 16,0-1-16,1 19 0,-1-19 16,18 1-16,-17-1 0,34 19 15,1-19 1,17-17-16,0 0 15,1-17-15,-19 17 0,1-18 16,17-17-16,-17 17 16,-18-17-1,0 17-15,-18 18 16,18-17-16,-17-1 0,-1 18 16,0 0-1,18 18-15,0-1 16,0 1-1,18-18-15,0 0 16,-1 0 0,1 0-16,-18-18 15,0 1-15,17 17 0,1-18 16,0 0-16,-1 18 16,36 18-1,-17 0-15,-19-1 0,36 36 16,-35-35-16,-1-1 15,1-17-15,-36 0 16,-17 0 0,18 0-1,-36-17-15,35-1 16,-17-17-16,17 17 16</inkml:trace>
-  <inkml:trace contextRef="#ctx0" brushRef="#br0" timeOffset="93385.2163">29633 7779 0,'53'0'16,"-106"0"-16,124 0 0,-1-36 16,-52 19-16,17 17 15,-17-18-15,0 1 0,-1 17 16,-17-36-1,0 19-15,-35-19 0,17 19 16</inkml:trace>
+  <inkml:trace contextRef="#ctx0" brushRef="#br0" timeOffset="93385.2162">29633 7779 0,'53'0'16,"-106"0"-16,124 0 0,-1-36 16,-52 19-16,17 17 15,-17-18-15,0 1 0,-1 17 16,-17-36-1,0 19-15,-35-19 0,17 19 16</inkml:trace>
   <inkml:trace contextRef="#ctx0" brushRef="#br0" timeOffset="93551.6553">29739 7497 0,'0'88'15,"0"-176"-15,0 229 0,0-106 16,-17 71-1,17-53-15,0 17 16,17-34-16,1-1 16,-1-35-1</inkml:trace>
   <inkml:trace contextRef="#ctx0" brushRef="#br0" timeOffset="93857.6192">29810 7920 0,'0'0'0,"17"0"16,1 0-16,0-18 15,17 1-15,-17 17 16,-1-18-16,1 18 16,-18-18-16,-18 1 15,1 17 1,-1 0 0,0 35-16,18-17 15,0 35-15,18-36 16,17 18-1,0-17-15,-17-18 0,35 0 16,-35 0-16,-18-18 16,17-17-1,-17 18-15,0-19 16,0 19-16,18-1 0,0 0 16,35 1-1,-36 17-15,18 0 16,-17 17-16</inkml:trace>
-  <inkml:trace contextRef="#ctx0" brushRef="#br0" timeOffset="94142.002">30833 7303 0,'0'0'0,"0"17"0,-18 54 16,18-18-16,18 52 16,-1-52-1,1 71-15,0-71 16,-1 53-16,1-71 15,0 35 1,-18-52-16,17 0 0</inkml:trace>
+  <inkml:trace contextRef="#ctx0" brushRef="#br0" timeOffset="94142.0019">30833 7303 0,'0'0'0,"0"17"0,-18 54 16,18-18-16,18 52 16,-1-52-1,1 71-15,0-71 16,-1 53-16,1-71 15,0 35 1,-18-52-16,17 0 0</inkml:trace>
   <inkml:trace contextRef="#ctx0" brushRef="#br0" timeOffset="94863.0833">31044 7885 0,'36'17'0,"-72"-34"0,89 34 16,-35-17-16,17-17 15,-17-1-15,17 18 0,-17-18 0,-1 1 16,-17-1-16,18 0 16,-36-17-16,18 17 15,-35 1-15,18 17 16,-19 35-1,1-17-15,35-1 0,-18 19 16,18-1 0,18-17-16,35 17 15,-35-17-15,52-18 16,-52 0-16,35 0 16,-36-18-16,1 18 15,0-18-15,-1 1 0,1-1 16,0 0-16,-18 1 15,-18 17 1,0 0 0,1 17-16,17 19 15,-18-19-15,18 1 16,18 0-16,-1-1 16,1 1-1,0-18-15,-1 0 16,1 0-1,-18-18 1,0 1-16,17-1 16,-17 0-1,18 18 32,0 0-31,-1 0-1,1-17 1,-18-1-16,18 0 16,-18 1-16,17-1 15,19 0 1,-19 1-16,1 17 16,-1 0-16,1 0 15,0 0 1,-18 17-16</inkml:trace>
   <inkml:trace contextRef="#ctx0" brushRef="#br0" timeOffset="95163.5995">31697 7920 0,'0'18'15,"18"-18"1,-18-18 0,17 0-1,1 1-15,0-1 0,17-17 16,-17 17-16,-1 0 16,1 1-16,-1 17 15,-17 35 1,0-17-16,0-1 0,0 1 15,0 0-15,0-1 16,0 1-16,0 0 16,18-18-16</inkml:trace>
-  <inkml:trace contextRef="#ctx0" brushRef="#br0" timeOffset="95663.7975">31997 7814 0,'0'18'15,"0"-1"-15,0 1 16,18 0-16,-18-1 16,17 1-16,1-18 0,0 0 15,-18 18-15,17-18 0,-17-18 16,0 0-1,0 1-15,0-1 16,0-17 0,0 17-16,-17 18 15,34 0 1,1 18 0,-18-1-16,35 1 15,-35 0 1,18-1-16,-18 1 15,17-18-15,1 35 16,0 0-16,-18-17 0,17 17 16,1 18-16,0-17 15,-1 34 1,-17-17-16,0-35 16,0-1-16,-17-34 15,-1-19 1,0 19-16,1-54 15,17 54 1,0-19-16,17 1 0,1 0 16,0-1-16,52-34 15</inkml:trace>
+  <inkml:trace contextRef="#ctx0" brushRef="#br0" timeOffset="95663.7974">31997 7814 0,'0'18'15,"0"-1"-15,0 1 16,18 0-16,-18-1 16,17 1-16,1-18 0,0 0 15,-18 18-15,17-18 0,-17-18 16,0 0-1,0 1-15,0-1 16,0-17 0,0 17-16,-17 18 15,34 0 1,1 18 0,-18-1-16,35 1 15,-35 0 1,18-1-16,-18 1 15,17-18-15,1 35 16,0 0-16,-18-17 0,17 17 16,1 18-16,0-17 15,-1 34 1,-17-17-16,0-35 16,0-1-16,-17-34 15,-1-19 1,0 19-16,1-54 15,17 54 1,0-19-16,17 1 0,1 0 16,0-1-16,52-34 15</inkml:trace>
   <inkml:trace contextRef="#ctx0" brushRef="#br0" timeOffset="95797.6713">32808 7938 0</inkml:trace>
-  <inkml:trace contextRef="#ctx0" brushRef="#br0" timeOffset="106740.952">3687 8502 0,'-18'-53'16,"18"35"-16,0 1 15,0 34-15,0 54 16,18-18 0,-1 88-16,-17-53 15,0-17-15,0-1 0,18-17 16,-18 0-16,17-35 16,1-71-1,0-35 1,-18-36-16,0 54 15,0-54 1,0 71-16,0-17 0,17-19 16,-17 72-16,0-1 15,18 18-15,0 0 0,-1 53 16,1 0-16,0 18 16,-1-36-16,36 0 15,-35-17-15,17-36 16,-17 1-16,17-36 15,-17 17 1,-1-52-16,-17 53 16,18-18-16,0 35 15,-18 36 1,17 35 0,-17 0-16,0 35 15,18-35-15,-1 17 16,-17-34-16,18-1 15,0 0-15</inkml:trace>
-  <inkml:trace contextRef="#ctx0" brushRef="#br0" timeOffset="106997.8332">4392 8714 0,'18'70'16,"-36"-140"-16,36 175 0,-1-34 15,1-71-15,17 18 16,-17-36 0,17-17-16,-35 17 15,0-35-15,0 18 16,-35-36-16,0 54 16,-1-36-1,19 53-15,-1-18 0,0 18 16,1 0-16,34 0 15</inkml:trace>
+  <inkml:trace contextRef="#ctx0" brushRef="#br0" timeOffset="106740.9519">3687 8502 0,'-18'-53'16,"18"35"-16,0 1 15,0 34-15,0 54 16,18-18 0,-1 88-16,-17-53 15,0-17-15,0-1 0,18-17 16,-18 0-16,17-35 16,1-71-1,0-35 1,-18-36-16,0 54 15,0-54 1,0 71-16,0-17 0,17-19 16,-17 72-16,0-1 15,18 18-15,0 0 0,-1 53 16,1 0-16,0 18 16,-1-36-16,36 0 15,-35-17-15,17-36 16,-17 1-16,17-36 15,-17 17 1,-1-52-16,-17 53 16,18-18-16,0 35 15,-18 36 1,17 35 0,-17 0-16,0 35 15,18-35-15,-1 17 16,-17-34-16,18-1 15,0 0-15</inkml:trace>
+  <inkml:trace contextRef="#ctx0" brushRef="#br0" timeOffset="106997.8331">4392 8714 0,'18'70'16,"-36"-140"-16,36 175 0,-1-34 15,1-71-15,17 18 16,-17-36 0,17-17-16,-35 17 15,0-35-15,0 18 16,-35-36-16,0 54 16,-1-36-1,19 53-15,-1-18 0,0 18 16,1 0-16,34 0 15</inkml:trace>
   <inkml:trace contextRef="#ctx0" brushRef="#br0" timeOffset="107704.4716">4692 8784 0,'18'71'0,"-36"-142"0,36 159 15,-18-70-15,0-36 31,0-35-15,0 18-16,0-18 16,-18-17-16,18 52 15,0 36 1,18 17 0,-1 0-16,1 18 15,0-35-15,-1 17 16,1-17-1,-1-18-15,-17-18 16,0-17 0,18 0-16,-18-1 15,0 19 1,0-1-16,18 18 16,-18 18-1,17 17-15,-17-17 16,18 34-1,0-34-15,-1 0 0,19-18 16,-1 0-16,-18 0 16,1 0-16,17-36 15,1 1 1,-36 18-16,0-36 0,0 35 16,-18-17-1,0 35-15,1 0 16,-1 0-16,-17 17 0,17 1 0,1 17 15,17-17-15,0 35 16,35 0 0,-18-36-16,1 1 15,17 0-15,-17-18 0,17 17 16,-17-17 0,0-17-1,-18-1-15,0 0 16,0 1-16,0-1 15,17 18 1,1 18 0,-1-18-16,1 17 15,0 19 1,-1-36-16,-17 17 0,18 1 16</inkml:trace>
   <inkml:trace contextRef="#ctx0" brushRef="#br0" timeOffset="107888.1767">5398 8784 0,'0'0'0,"17"0"0,18 18 15,1-18-15,-19-18 0,36 1 16,-35 17-1,0-18-15,-18 0 16,-18 18-16</inkml:trace>
   <inkml:trace contextRef="#ctx0" brushRef="#br0" timeOffset="108070.7715">5380 8467 0,'0'106'16,"0"-212"-16,0 264 0,0-52 16,18-35-16,-18-18 0,17 0 15,1-18-15,-1 18 0,36-18 16,-35-17-16,0-18 16</inkml:trace>
@@ -218,20 +214,20 @@
   <inkml:trace contextRef="#ctx0" brushRef="#br0" timeOffset="121734.7833">6685 9596 0,'0'0'16,"0"70"-16,0-17 0,0 53 15,0-53-15,18 35 16,-18-53-16,17 1 16,1 16-16,0-34 15,-1-18 1,1 0-16</inkml:trace>
   <inkml:trace contextRef="#ctx0" brushRef="#br0" timeOffset="121857.737">6844 10019 0,'0'35'16,"0"-70"-16,0 88 0,18-36 0,-18 1 15,17-18 1,1 0-16</inkml:trace>
   <inkml:trace contextRef="#ctx0" brushRef="#br0" timeOffset="121999.9732">6897 9860 0,'17'-17'0,"-34"34"0,52-34 16,-17 34-1,-1 1 1,1-1-1,-18 1-15</inkml:trace>
-  <inkml:trace contextRef="#ctx0" brushRef="#br0" timeOffset="122173.9072">6985 9966 0,'18'35'16,"-18"-17"-1,17-18 1,1 0-16,0 0 16,-1-18-16,18 18 15,-35-17-15,18 34 16,-18 1-16,18 0 15,-18-1-15,35 18 16,-17-35 0</inkml:trace>
+  <inkml:trace contextRef="#ctx0" brushRef="#br0" timeOffset="122173.9071">6985 9966 0,'18'35'16,"-18"-17"-1,17-18 1,1 0-16,0 0 16,-1-18-16,18 18 15,-35-17-15,18 34 16,-18 1-16,18 0 15,-18-1-15,35 18 16,-17-35 0</inkml:trace>
   <inkml:trace contextRef="#ctx0" brushRef="#br0" timeOffset="122591.1303">7955 9807 0,'88'0'15,"-70"0"-15,35 0 16,-18-17-16,-17 17 16,17-18-16,0 0 15</inkml:trace>
   <inkml:trace contextRef="#ctx0" brushRef="#br0" timeOffset="122787.7014">8096 9543 0,'-35'53'16,"70"-106"-16,-88 158 0,36 1 16,17-53-16,17 53 15,1-71 1,17 1-16,18 17 15,-18-36-15,54 1 16,-36-18-16,35 0 16,-53-18-16</inkml:trace>
   <inkml:trace contextRef="#ctx0" brushRef="#br0" timeOffset="122941.0626">8714 9543 0,'17'0'15,"-17"17"1,0 19 0</inkml:trace>
   <inkml:trace contextRef="#ctx0" brushRef="#br0" timeOffset="123042.5471">8819 9948 0,'0'18'0,"0"-36"0,18 36 16,-18-36-1</inkml:trace>
   <inkml:trace contextRef="#ctx0" brushRef="#br0" timeOffset="132652.1086">5256 10742 0,'-17'-18'16,"-1"1"-16,-17 17 15,0 17-15,-36 36 16,36-17-16,17 17 15,-17 17-15,17-17 0,1 71 16,17-72-16,35 37 16,0-36-16,36-1 15,-36-34-15,71-18 16,-71 0-16,53-18 16,-52 1-16,-19-1 15,1 1-15,-18-1 0,0 0 16,-18 18-1,1 36 1,17-19-16,0 54 16,17-54-16,1 1 15,35 0-15,-36-1 16,36-34-16,-17 17 16,-1-36-16,-35 19 15,0-1-15,0-17 0,-18-18 16,-17 35-16,17 1 15,-35-1 1,18 18-16,35-18 16</inkml:trace>
-  <inkml:trace contextRef="#ctx0" brushRef="#br0" timeOffset="133301.4341">5768 11465 0,'0'36'0,"0"-72"0,18 72 16,-18-72-1,0 19-15,0-19 16,0-52 0,0 53-16,0-18 15,0 35-15,17 18 16,-17 18-16,0 0 15,18-1-15,-1 36 16,-17-35-16,36-1 16,-19 1-16,1-18 15,0 0-15,-1-18 16,1 18-16,0-35 16,-18 18-16,0-19 15,17 54 16,-17 0-15,0-1-16,18 18 16,0 1-16,-18-19 15,35 36 1,-35-35-16,17 52 16,-17-17-16,0 18 15,0-53-15,0-1 0,-35 1 16,18-36-1,-1 1-15,0-19 16,18 19-16,-17-72 16,17 54-16,0-18 0,0 18 15,17-53-15,19 35 16,-19 35-16,18 1 16,18-1-1,-35 18-15,0 18 0,-1-1 16,-17 1-16,0 35 15,-17-36-15,-1 1 0,-35 17 16,18-17-16,0-18 16,35-18-1,0-17 1</inkml:trace>
+  <inkml:trace contextRef="#ctx0" brushRef="#br0" timeOffset="133301.434">5768 11465 0,'0'36'0,"0"-72"0,18 72 16,-18-72-1,0 19-15,0-19 16,0-52 0,0 53-16,0-18 15,0 35-15,17 18 16,-17 18-16,0 0 15,18-1-15,-1 36 16,-17-35-16,36-1 16,-19 1-16,1-18 15,0 0-15,-1-18 16,1 18-16,0-35 16,-18 18-16,0-19 15,17 54 16,-17 0-15,0-1-16,18 18 16,0 1-16,-18-19 15,35 36 1,-35-35-16,17 52 16,-17-17-16,0 18 15,0-53-15,0-1 0,-35 1 16,18-36-1,-1 1-15,0-19 16,18 19-16,-17-72 16,17 54-16,0-18 0,0 18 15,17-53-15,19 35 16,-19 35-16,18 1 16,18-1-1,-35 18-15,0 18 0,-1-1 16,-17 1-16,0 35 15,-17-36-15,-1 1 0,-35 17 16,18-17-16,0-18 16,35-18-1,0-17 1</inkml:trace>
   <inkml:trace contextRef="#ctx0" brushRef="#br0" timeOffset="133753.1897">6244 11236 0,'0'0'15,"0"18"-15,0-1 16,0 19-16,0-19 16,0 1-16,0-1 15,18 1-15,-1 0 16,1-18-16,0 0 16,-1-18-1,1 0-15,-18-17 16,18 18-1,-18-1-15,0 0 16,0 36 0,17 0-1,1-18 1,0 17-16,-1 1 16,1-18-16,-36 0 31,18-18-16,-17 1-15,17-19 16,0 19-16,17-19 16,1 19-1,17 17-15,0-18 16,-17 18-16,17-18 0,-17 1 16,35-18-1,-35 35-15,-1-18 0,1 0 0,-18 1 16,0-1-1,0 0-15,-18 1 16</inkml:trace>
   <inkml:trace contextRef="#ctx0" brushRef="#br0" timeOffset="133908.4558">6579 10866 0,'18'88'15,"-36"-176"-15,36 211 0,-18-17 16,18-53-16,-18 35 15,17-53 1,-17-17-16,18 17 16,0-17-16,-1-18 15</inkml:trace>
   <inkml:trace contextRef="#ctx0" brushRef="#br0" timeOffset="134186.8339">6738 11271 0,'35'0'15,"1"-17"1,-1-19 0,0-17-16,-35 36 15,-35-1 1,0 36 0,-18-1-1,35 19-15,0 17 16,18-36-16,18 19 0,35-1 15,-18-35-15,53 17 16,-35-17-16,0-17 16,0 17-16,-18-18 0,1 18 15,-1-17-15,-17 17 16,-18-18-16</inkml:trace>
   <inkml:trace contextRef="#ctx0" brushRef="#br0" timeOffset="134876.6452">8220 11060 0,'0'0'16,"-71"53"-16,54-18 0,-36 35 15,35-34-15,18-19 16,0 1-16,18 0 0,17-1 16,0-17-16,36-35 15,-36 17-15,36-70 16,-36 53 0,-18-18-16,1-18 0,17-35 15,-35 54-15,-17-19 16,-1 18-16,-35-53 15,18 53-15,-36-17 16,36 52-16,17 1 16,1 17-16,-1 35 0,1 0 15,17 0-15,0 36 0,17-1 16,1 1-16,17 0 0,53 52 16,-52-70-16,16-18 15,37 53-15,-36-70 16,-18 17-16,0-17 0,18 0 15</inkml:trace>
   <inkml:trace contextRef="#ctx0" brushRef="#br0" timeOffset="135360.0085">8767 10777 0,'-18'0'15,"36"0"-15,-36 18 0,0 35 16,1-18 0,17 0-16,0 18 0,0 36 15,17-54-15,-17 0 16,18 0-16,17-17 0,-17 0 15,-1-1-15,1-17 0,17 0 16,-17-17-16,0-19 16,-1 19-1,1-1-15,-18 1 16,18 17-16,17 17 16,-18 1-16,36 17 15,-17-17-15,-1-1 16,0-17-16,53 0 15,-52-17-15,-19-1 0,19-35 16,-36 18-16,-18-36 16,0 36-1,-35-53-15,18 53 16,-35-54-16,34 54 16,19 0-16,-1 17 0,36 36 31,-1-1-16</inkml:trace>
   <inkml:trace contextRef="#ctx0" brushRef="#br0" timeOffset="135576.7067">9631 11201 0,'0'17'16,"0"-34"-16,0 52 0,-18-17 15,1-1-15,-1 1 0,-17 17 16,17-17-16,0 17 16</inkml:trace>
-  <inkml:trace contextRef="#ctx0" brushRef="#br0" timeOffset="136216.9897">10178 11007 0,'0'0'0,"-18"0"0,0 0 0,-17-18 16,0 18-1,0 18-15,17-1 0,0 1 0,1 0 16,-1 35 0,18-18-16,0-18 0,18 1 15,17 17-15,0-35 16,36 0-16,-54 0 15,54-53 1,-53 18-16,-1-35 16,1 34-16,-18-52 15,-18 35-15,-17-53 16,0 53-16,-18-35 16,35 35-16,-35 0 15,18 53-15,17 0 16,1 18-16,17 17 15,17 54-15,1-19 16,35 36-16,0-36 16,-18-34-16,18 17 0,0-18 15,17 36 1,-34-36-16,17 0 16,-36-17-16,1-18 15</inkml:trace>
+  <inkml:trace contextRef="#ctx0" brushRef="#br0" timeOffset="136216.9896">10178 11007 0,'0'0'0,"-18"0"0,0 0 0,-17-18 16,0 18-1,0 18-15,17-1 0,0 1 0,1 0 16,-1 35 0,18-18-16,0-18 0,18 1 15,17 17-15,0-35 16,36 0-16,-54 0 15,54-53 1,-53 18-16,-1-35 16,1 34-16,-18-52 15,-18 35-15,-17-53 16,0 53-16,-18-35 16,35 35-16,-35 0 15,18 53-15,17 0 16,1 18-16,17 17 15,17 54-15,1-19 16,35 36-16,0-36 16,-18-34-16,18 17 0,0-18 15,17 36 1,-34-36-16,17 0 16,-36-17-16,1-18 15</inkml:trace>
   <inkml:trace contextRef="#ctx0" brushRef="#br0" timeOffset="136576.9027">10495 10548 0,'0'35'0,"0"-70"0,0 176 16,0-88-16,0 0 0,0 0 15,18 0-15,-18 0 0,17 17 16,-17-34-16,0 17 16,0-36-1,18-17 1,0-17-16,17-1 16,-17 18-16,17 0 15,-17 0-15,17 18 0,-18-18 16,36 35-16,-35-18 15,0 19 1,-36-19 0,-17-17-16,-1 0 15,19 0-15,-54-17 16,54-1-16,-19 0 16,36 1-16</inkml:trace>
   <inkml:trace contextRef="#ctx0" brushRef="#br0" timeOffset="142612.9056">12153 10901 0,'0'0'0,"-35"0"0,35 17 16,-18-17-16,1 18 0,17 0 15,-18-1-15,18 1 0,18 17 16,-1-17-16,19 0 15,-19-18 1,36 0-16,-35 0 16,35-36-16,-53 19 15,0-36-15,0 35 16,-36-35-16,19 53 16,-19-17-16,19 17 0,-36 17 15,35-17 1,1 53-16</inkml:trace>
   <inkml:trace contextRef="#ctx0" brushRef="#br0" timeOffset="142870.912">12541 11077 0,'-35'0'16,"35"-17"-1,-18-19-15,18 1 16,18 17-16,-18 1 0,35-1 16,-17 18-16,17 0 15,18 0 1,-35 18-16,17-1 0,0 19 16,-35-1-16,18-17 15,-18-1-15,0 19 16,0-19-16,0 1 0</inkml:trace>
@@ -243,12 +239,12 @@
   <inkml:trace contextRef="#ctx0" brushRef="#br0" timeOffset="146126.4785">16457 10760 0,'18'35'15,"-36"-70"-15,36 105 0,-1-17 16,-17-35-16,0-1 16,0-34-1,-17-36 1,17 18-1,0-1-15,0 1 16,17 17-16,-17 1 16,36 17-1,-36 17-15,17 1 0,1 17 16,0 1-16,-1-1 16,1-35-1,-1-18 1,-17-17-1,18 17-15,0-17 16,-1 35-16,1-18 16,0 18-16,-1 18 15,-17 17-15,18 1 16,-18 17-16,0-36 16,18 36-16,-18-35 15,17-1-15,1-17 16,17 0-1,-35-17-15,18-1 16</inkml:trace>
   <inkml:trace contextRef="#ctx0" brushRef="#br0" timeOffset="146254.2122">16916 10830 0,'0'0'0,"17"36"15,-17-19-15,0 1 0,18 17 16,0-17-16,17-18 15</inkml:trace>
   <inkml:trace contextRef="#ctx0" brushRef="#br0" timeOffset="146394.2003">16898 10601 0,'0'-18'15,"18"18"1,-18 18 0</inkml:trace>
-  <inkml:trace contextRef="#ctx0" brushRef="#br0" timeOffset="146721.9145">17127 10936 0,'0'18'16,"0"-36"-16,0 53 0,0-52 31,18-19-31,-18 19 16,18-36-16,-18 35 15,0 1-15,17-19 16,-17 19-16,18-1 15,0 18-15,17 18 16,-35 35 0,17 17-1,-17-17-15,0-18 16,18 1-16,0-19 16,-18 1-1,17-36-15</inkml:trace>
-  <inkml:trace contextRef="#ctx0" brushRef="#br0" timeOffset="147028.8846">17463 10883 0,'0'18'31,"0"17"-15,0-17-16,17-1 0,-17 1 15,18 0 1,-18-1-16,0 1 16</inkml:trace>
+  <inkml:trace contextRef="#ctx0" brushRef="#br0" timeOffset="146721.9144">17127 10936 0,'0'18'16,"0"-36"-16,0 53 0,0-52 31,18-19-31,-18 19 16,18-36-16,-18 35 15,0 1-15,17-19 16,-17 19-16,18-1 15,0 18-15,17 18 16,-35 35 0,17 17-1,-17-17-15,0-18 16,18 1-16,0-19 16,-18 1-1,17-36-15</inkml:trace>
+  <inkml:trace contextRef="#ctx0" brushRef="#br0" timeOffset="147028.8845">17463 10883 0,'0'18'31,"0"17"-15,0-17-16,17-1 0,-17 1 15,18 0 1,-18-1-16,0 1 16</inkml:trace>
   <inkml:trace contextRef="#ctx0" brushRef="#br0" timeOffset="147171.468">17445 10672 0,'0'0'0,"18"0"16,-1 17-1</inkml:trace>
   <inkml:trace contextRef="#ctx0" brushRef="#br0" timeOffset="147327.7549">17621 10901 0,'36'0'0,"-19"0"15,18 0-15,1-18 16,-19 18-16,1-17 0,17-1 16</inkml:trace>
   <inkml:trace contextRef="#ctx0" brushRef="#br0" timeOffset="147722.516">17921 10407 0,'0'0'0,"0"88"15,0-53-15,18 71 16,-1-53-16,-17 0 16,18 0-16,-18 0 0,0-18 15,18 0-15,-18-17 0,0 0 16,0-1-16,0 1 16,0-36-1,17 1-15,1-19 16,17 19-16,-17 17 15,52-18-15,-34 36 16,-1-1-16,-17 1 16,-18 0-16,17-1 15,-34 1-15,-1 0 16,-17-18-16,-1 17 16,19-17-16,-1 0 15</inkml:trace>
-  <inkml:trace contextRef="#ctx0" brushRef="#br0" timeOffset="148206.8507">18344 10883 0,'0'0'0,"-17"18"0,-1-1 15,1 1-15,17 17 16,-18 1-16,18-19 15,18 1 1,-1 0-16,1-18 0,17 0 16,-17 0-16,-18-18 15,17 0-15,-17 1 16,0-1-16,-17-17 16,17 17-16,0 0 15,0 1-15,0-1 16,17 36-1,1-18 1,0 17 0,-18 1-16,17-18 0,1 0 15,-18 18 1,0-36 0,-18 18-1,18-18 1,36 18-16,-1 0 15,0-17 1,0 17-16,18-18 16,-17 18-16,-1-17 15,-17-1-15,-36 18 32,0 0-17</inkml:trace>
+  <inkml:trace contextRef="#ctx0" brushRef="#br0" timeOffset="148206.8506">18344 10883 0,'0'0'0,"-17"18"0,-1-1 15,1 1-15,17 17 16,-18 1-16,18-19 15,18 1 1,-1 0-16,1-18 0,17 0 16,-17 0-16,-18-18 15,17 0-15,-17 1 16,0-1-16,-17-17 16,17 17-16,0 0 15,0 1-15,0-1 16,17 36-1,1-18 1,0 17 0,-18 1-16,17-18 0,1 0 15,-18 18 1,0-36 0,-18 18-1,18-18 1,36 18-16,-1 0 15,0-17 1,0 17-16,18-18 16,-17 18-16,-1-17 15,-17-1-15,-36 18 32,0 0-17</inkml:trace>
   <inkml:trace contextRef="#ctx0" brushRef="#br0" timeOffset="148384.8387">18627 10672 0,'0'0'0,"0"52"16,-18-16-16,18-1 0,0 18 15,0-18-15,18 36 16,-18-54-16,17 19 15,1-1 1,-18-17-16</inkml:trace>
   <inkml:trace contextRef="#ctx0" brushRef="#br0" timeOffset="148886.0347">18803 10954 0,'-18'17'16,"1"-17"-16,17 18 0,0 17 16,0-17-16,17 17 15,1-35-15,17 18 16,-17-18-16,17-18 16,1-17-1,-19 17-15,1-35 16,-18 18-16,17-35 15,-17 34-15,-17 1 16,17-18-16,0 0 0,-18 0 0,18 0 16,-17-35-1,17 53-15,-18 35 16,18 18-16,0 17 0,0 18 16,18 17-16,-18 1 0,0 70 15,17-88-15,1 53 16,-18-71-1,17 0-15,1-35 16,-18-17 0,18-1-16,-18 0 0,17 1 15,1-19-15,0 19 16,-1-1 0,-17 36-16,18-18 0,-18 35 15,18 0-15,-18-17 16,0 17-1,0 1-15,0-19 16</inkml:trace>
   <inkml:trace contextRef="#ctx0" brushRef="#br0" timeOffset="149023.911">19420 11060 0,'-17'-18'16,"-18"18"-16,17 0 16</inkml:trace>
@@ -257,26 +253,26 @@
   <inkml:trace contextRef="#ctx0" brushRef="#br0" timeOffset="171433.9871">6103 12788 0,'0'-17'0,"0"-1"16,0 0-16,0 1 16,0-1-16,0 0 15,-18 36 16,18 35-15,-17-18 0,17 18-16,0-18 15,0 18-15,0-35 16,17-18-16,-17 18 0,36-1 16,17-34-1,-18-1 1,-17-17-1,-1 35 1,-17 17 0,0 1-16,18 0 0,-1 35 15,19-36-15,-1 18 16,-17-35-16,35 0 16,-36-17-16,1-18 15,-18 17-15,0-53 16,-18 36-16,1 17 15,-19-35 1,1 18-16,17 18 0,1 17 16,34 0-1,1 17 1</inkml:trace>
   <inkml:trace contextRef="#ctx0" brushRef="#br0" timeOffset="171674.9391">6756 12541 0,'35'0'15,"-17"0"-15,35-17 16,-18 17-16,0 0 16,-17 0-1</inkml:trace>
   <inkml:trace contextRef="#ctx0" brushRef="#br0" timeOffset="171790.8577">6809 12788 0,'35'18'0,"-70"-36"0,88 36 16,-36-36-16,18 18 16,-17-17-16,17 17 0,-17 0 15</inkml:trace>
-  <inkml:trace contextRef="#ctx0" brushRef="#br0" timeOffset="173648.8997">8290 13511 0,'0'-17'15,"-17"-1"1,-1-17-16,-17-36 16,17 18-16,-17 0 15,0-105-15,17 70 16,18-1-16,-53-211 15,53 106 1,0 124-16,35-36 16,-17 71-16,0 17 15,17 36 1,0-1-16,-17 19 0,-1-1 16,1 18-16,-18 53 15,0-53-15,0 35 16,0-53-16,0 0 15,0-17-15,0 0 0,18-1 16,-18 1-16,35-18 0,18 18 16,-18-18-16,18 17 15,-18 1-15,-17-1 16,-18 1-16,-35 35 16,-1-35-16,1-1 15,0 1-15,-18-18 0,18 18 16,-36-18-1,53 0-15,1 0 0,-1-18 16,36 0-16,-1 1 16</inkml:trace>
+  <inkml:trace contextRef="#ctx0" brushRef="#br0" timeOffset="173648.8996">8290 13511 0,'0'-17'15,"-17"-1"1,-1-17-16,-17-36 16,17 18-16,-17 0 15,0-105-15,17 70 16,18-1-16,-53-211 15,53 106 1,0 124-16,35-36 16,-17 71-16,0 17 15,17 36 1,0-1-16,-17 19 0,-1-1 16,1 18-16,-18 53 15,0-53-15,0 35 16,0-53-16,0 0 15,0-17-15,0 0 0,18-1 16,-18 1-16,35-18 0,18 18 16,-18-18-16,18 17 15,-18 1-15,-17-1 16,-18 1-16,-35 35 16,-1-35-16,1-1 15,0 1-15,-18-18 0,18 18 16,-36-18-1,53 0-15,1 0 0,-1-18 16,36 0-16,-1 1 16</inkml:trace>
   <inkml:trace contextRef="#ctx0" brushRef="#br0" timeOffset="174038.3737">8678 12347 0,'0'0'15,"0"-17"-15,18 34 16,0 54-1,-1-18-15,19 53 16,-19-54-16,1 1 0,-1 0 16,1-17-16,0-1 0,-1-18 15,19 19-15,-19-36 16,1 0 0,-18-18-16,18-52 15,-18 34-15,-18-52 16,18 53-16,-18-71 15,1 71-15,-1-18 16,18 35-16</inkml:trace>
-  <inkml:trace contextRef="#ctx0" brushRef="#br0" timeOffset="175507.0204">9278 12841 0,'0'-18'15,"0"1"-15,0-1 16,-18 18-16,1 0 16,-1 0-1,1 18-15,-19-1 16,19 1-16,17 0 0,-18 35 15,18-36-15,18 19 16,-1-19-16,19 1 16,-19-18-16,18 0 15,-17 0-15,17-35 16,-35 17-16,18-17 16,-18-1-1,-18-17-15,18 18 16,-17-18-16,-1 36 15,0-19-15,18 19 16,-17 17-16,17 17 16,17 19-1,-17-19-15,18 19 16,0 16-16,-1-16 16,1-1-16,0 0 15,17 1 1,-17-19-16,-1-17 0,18 18 15,-17-18-15,-18-18 16</inkml:trace>
+  <inkml:trace contextRef="#ctx0" brushRef="#br0" timeOffset="175507.0203">9278 12841 0,'0'-18'15,"0"1"-15,0-1 16,-18 18-16,1 0 16,-1 0-1,1 18-15,-19-1 16,19 1-16,17 0 0,-18 35 15,18-36-15,18 19 16,-1-19-16,19 1 16,-19-18-16,18 0 15,-17 0-15,17-35 16,-35 17-16,18-17 16,-18-1-1,-18-17-15,18 18 16,-17-18-16,-1 36 15,0-19-15,18 19 16,-17 17-16,17 17 16,17 19-1,-17-19-15,18 19 16,0 16-16,-1-16 16,1-1-16,0 0 15,17 1 1,-17-19-16,-1-17 0,18 18 15,-17-18-15,-18-18 16</inkml:trace>
   <inkml:trace contextRef="#ctx0" brushRef="#br0" timeOffset="175928.6671">9507 12718 0,'0'35'31,"0"18"-31,0-36 16,18 19-16,-18-19 15,0 19-15,18-1 16,17-17-16,-17-18 16,-1 0-1,1-18 1,-1 0-1,-17 1-15,18-1 16,-18 36 0,18 17-16,-1-17 15,19-1 1,-1-17-16,-17 18 0,35-18 16,-36-18-16,1 18 15,-1-35-15,-17 17 16,0-17-16,0 17 15,-35-35-15,18 36 16,-1-36-16,0 35 16,18 1-1,0-1-15,0 36 16</inkml:trace>
   <inkml:trace contextRef="#ctx0" brushRef="#br0" timeOffset="176518.5128">10619 12506 0,'0'0'0,"17"0"32,19 0-17,-1 0-15,0 0 0,0 0 16,-17 0-16,53 0 15,-54 0-15,18 18 16</inkml:trace>
   <inkml:trace contextRef="#ctx0" brushRef="#br0" timeOffset="176696.2913">10777 12347 0,'0'0'16,"0"71"-16,0-36 0,0 18 0,0-18 16,0 18-1,18-18-15,-18 1 0,35 17 16,-17-36-16,17-17 16</inkml:trace>
-  <inkml:trace contextRef="#ctx0" brushRef="#br0" timeOffset="177276.0214">12065 12083 0,'-18'-71'15,"36"142"-15,-36-177 0,1 71 16,-1 35 0,18 17-1,-18 71-15,18-17 16,0 70 0,0-53-16,18 53 0,0-88 15,-18 0-15,35 53 16,0-71-16,1 18 15,-1-35-15,35-1 16,-52-17-16,17-17 16</inkml:trace>
-  <inkml:trace contextRef="#ctx0" brushRef="#br0" timeOffset="177509.5584">12418 12030 0,'0'-18'0,"0"36"0,0-1 15,0 72 1,17-19-16,-17 18 16,0-17-16,18 17 0,0 53 15,-18-88-15,35 53 16,-17-71-16,17 18 15,-35-35-15,18-18 16</inkml:trace>
+  <inkml:trace contextRef="#ctx0" brushRef="#br0" timeOffset="177276.0213">12065 12083 0,'-18'-71'15,"36"142"-15,-36-177 0,1 71 16,-1 35 0,18 17-1,-18 71-15,18-17 16,0 70 0,0-53-16,18 53 0,0-88 15,-18 0-15,35 53 16,0-71-16,1 18 15,-1-35-15,35-1 16,-52-17-16,17-17 16</inkml:trace>
+  <inkml:trace contextRef="#ctx0" brushRef="#br0" timeOffset="177509.5583">12418 12030 0,'0'-18'0,"0"36"0,0-1 15,0 72 1,17-19-16,-17 18 16,0-17-16,18 17 0,0 53 15,-18-88-15,35 53 16,-17-71-16,17 18 15,-35-35-15,18-18 16</inkml:trace>
   <inkml:trace contextRef="#ctx0" brushRef="#br0" timeOffset="177675.5975">12771 12559 0,'35'0'15,"-18"0"-15,19-18 16,-19 18 0,1 0-16,17 0 0,1-17 15,-19 17 1</inkml:trace>
   <inkml:trace contextRef="#ctx0" brushRef="#br0" timeOffset="178186.6538">13300 13388 0,'0'0'16,"0"-18"-16,0 1 0,17-54 15,-17 36 1,0-18-16,0 0 0,-17-70 16,-1 52-16,0-17 15,18 17-15,-35-105 16,35 105-16,0 1 0,0 17 16,18 35-1,17 18-15,18 18 16,-35-1-16,35 19 15,-36-1-15,18 0 16,-35 1-16,0-1 16,0-18-1,0 1-15,0 0 0,0 17 16,18-17 0,17-1-16,-35 1 15,36 17-15,-19-17 16,-17-1-1,-17-17-15,-19 18 16,1-18-16,17 0 16,-34 0-16,16-18 0,-17 18 15,36-17-15,-1-1 16</inkml:trace>
   <inkml:trace contextRef="#ctx0" brushRef="#br0" timeOffset="178526.8458">13529 11924 0,'0'0'15,"53"53"-15,-18-18 16,36 71-16,-36-53 16,0 17-16,18 54 15,-17-54-15,-1 54 16,-35-71-16,17 35 16,-34-53-16,-1 36 15,-17-54-15,0 19 16,17-19-16,-17 1 15,17-18-15,0 0 16</inkml:trace>
   <inkml:trace contextRef="#ctx0" brushRef="#br0" timeOffset="179782.1833">14429 12559 0,'0'0'0,"-18"-18"0,0 18 16,-17 0 0,17 0-16,-34 0 15,34 18-15,-17 17 16,17 0-16,0-17 0,18 17 15,0 1-15,18-19 16,17 1 0,1-18-16,-19 0 0,54-35 15,-36 17-15,18-53 16,-35 36-16,-18-53 16,0 53-16,0-18 15,-18 18-15,-17-89 16,-1 71-16,-17-35 15,36 35-15,-1 35 16,-17-35-16,17 53 16,18 36-1,0-1-15,18 71 16,0-36-16,17 54 16,-18-54-16,36 36 15,-35-53-15,17 0 16,18 18-16,-18-54 15,1 1-15,17 0 16,-36-18-16,19-18 16</inkml:trace>
   <inkml:trace contextRef="#ctx0" brushRef="#br0" timeOffset="180279.1116">14799 12171 0,'0'0'15,"0"17"1,0 72-1,0-54-15,0 53 16,0-35-16,18 18 16,-1-36-16,1-17 15,0-1-15,-1 1 0,1-18 16,0 17-16,-1-17 16,1-17-16,-1 17 46,1 35-30,0-17-16,35-1 16,-18 1-16,18-18 15,-18 0-15,0-18 16,-17 18-16,0-53 16,-18 18-16,-18-18 15,0 0-15,-35-17 16,18 17-16,-18-35 15,36 52-15,-1 1 16,0 35 0</inkml:trace>
   <inkml:trace contextRef="#ctx0" brushRef="#br0" timeOffset="181328.7891">14975 12524 0,'0'-18'31,"0"36"1,0-1-17,0 1 1,0 0-16,-17 34 0,17-34 16,0 0-1</inkml:trace>
-  <inkml:trace contextRef="#ctx0" brushRef="#br0" timeOffset="185233.559">19932 11853 0,'18'0'0,"-18"18"16,17 0-16,-17-1 0,18 1 15,-18 0-15,18 17 16,-1-18-16,-17 1 16,18 0-16,-18 17 15,17-35-15</inkml:trace>
+  <inkml:trace contextRef="#ctx0" brushRef="#br0" timeOffset="185233.5589">19932 11853 0,'18'0'0,"-18"18"16,17 0-16,-17-1 0,18 1 15,-18 0-15,18 17 16,-1-18-16,-17 1 16,18 0-16,-18 17 15,17-35-15</inkml:trace>
   <inkml:trace contextRef="#ctx0" brushRef="#br0" timeOffset="185360.7765">20197 11906 0,'0'53'15,"0"-35"-15,17 35 16,-17-18-16,0-17 0</inkml:trace>
   <inkml:trace contextRef="#ctx0" brushRef="#br0" timeOffset="186701.2723">20585 12100 0,'0'0'0,"17"18"16,-17 0-1,0-1-15,0 18 16,18 36-16,0-36 16,-18 54-1,17-54-15,-17 0 0,18 36 16,-18-54-16,17 1 16,-17 0-16,18-18 15,0-18-15,-1-17 16,1-1-16,0 1 15,-18 0-15,17 0 0,-17-18 16,18 17-16,-18 1 16,0-18-16,0 18 0,0 0 0,-18 17 15,18-17 1,0 17-16,-17 36 16</inkml:trace>
   <inkml:trace contextRef="#ctx0" brushRef="#br0" timeOffset="187505.9826">20973 12577 0,'0'0'16,"17"0"-16,-17-18 0,0 0 16,0 1-1,-17 17 17,-1 0-32,0 0 15,1 17 1,-1 1-16,18 0 15,0-1-15,-18 36 16,18-35-16,18 35 16,0-36-16,35 19 15,-36-36-15,36 0 16,-18 0-16,18-18 16,-35 0-16,0-17 15,-18 17-15,0-35 16,0 36-16,-18-18 15,-17-1-15,17 19 16,-17 17-16,-18 0 16,18 0-1,17 17-15,18 19 16,0-19-16,18 1 16,17 17-16,0-35 15,-17 18-15,-1-18 16,19 0-16,-19 17 0,1-17 15,0 0 1</inkml:trace>
   <inkml:trace contextRef="#ctx0" brushRef="#br0" timeOffset="188003.8778">21414 12294 0,'0'0'0,"17"0"0,1 18 16,0-18-16,34 18 15,-16-18 1,-1 0-16,-17 0 15,-1 0-15</inkml:trace>
-  <inkml:trace contextRef="#ctx0" brushRef="#br0" timeOffset="188130.8665">21519 12418 0,'53'0'16,"-35"17"-16,17-17 15,-17 0 1</inkml:trace>
+  <inkml:trace contextRef="#ctx0" brushRef="#br0" timeOffset="188130.8664">21519 12418 0,'53'0'16,"-35"17"-16,17-17 15,-17 0 1</inkml:trace>
   <inkml:trace contextRef="#ctx0" brushRef="#br0" timeOffset="188658.5899">22049 12965 0,'0'0'16,"0"17"-16,0-34 0,0-1 15,0-17-15,0-36 16,-18 36-16,-17-53 15,17 35 1,-17-71-16,17 54 16,1-1-16,17-35 15,0 71-15,35 0 16,0 17-16,36 18 16,-36 18-16,18 35 15,-36-36-15,1 19 16,-18-19-16,0 36 15,0-35-15,-35-1 16,35 1-16,17 0 31,19-1-15,-19 19 0,1-1-16,-18 0 15,0-17-15,-18-1 16,1-17-16,-36 18 15,35-18-15,-35-18 16,36 18-16,-1 0 16,0-17-16</inkml:trace>
   <inkml:trace contextRef="#ctx0" brushRef="#br0" timeOffset="189581.7667">22525 12277 0,'0'17'32,"18"36"-17,-18 0-15,35 35 16,-18-35-16,19 18 16,-19-36-16,36 18 15,-35-53-15,0 0 16,-1 0-16,18-18 15,-17-17-15,-18 17 16,18-17-16,-18-18 0,0-17 16,-18 34-16,0-16 15,18 16-15,-17 1 16,-1 35 0,18 18-16</inkml:trace>
   <inkml:trace contextRef="#ctx0" brushRef="#br0" timeOffset="190021.2352">23019 12541 0,'0'0'0,"-18"18"0,18 0 16,0-1-16,0 54 15,0-54-15,18 19 0,-1-1 16,1-17-16,0-1 0,35 1 16,-18-18-16,0-18 15,-17 18-15,17-17 0,0-36 16,-17 35-1,0-35-15,-18 35 16,-18-17-16,-17 18 16,-18 17-16,18 0 15,-18 0-15,35 0 16,-17 35 0,35-18-16,0 1 15,0 0-15,35-1 16,-17-17-16,-1 18 15,1-18-15,0 0 0,17 0 16,-18 0-16,1-18 0,0 18 16</inkml:trace>
@@ -284,33 +280,33 @@
   <inkml:trace contextRef="#ctx0" brushRef="#br0" timeOffset="190395.3148">23618 12506 0,'0'71'15,"0"-142"-15,18 177 0,0-53 16,-1-36-16,1-17 0</inkml:trace>
   <inkml:trace contextRef="#ctx0" brushRef="#br0" timeOffset="190900.7485">24342 12030 0,'-36'53'16,"72"-106"-16,-107 176 0,53 1 16,1-54-16,17 1 15,17 52 1,1-87-16,0 16 0,-1 1 15,1-17-15,0-19 0,-1 1 16,19 0-16,-19-18 16</inkml:trace>
   <inkml:trace contextRef="#ctx0" brushRef="#br0" timeOffset="191077.1916">24536 12241 0,'0'0'16,"0"106"-16,17-35 0,1 35 15,-18-53-15,18 35 16,-1-71-16,-17 19 16,18-36-16</inkml:trace>
-  <inkml:trace contextRef="#ctx0" brushRef="#br0" timeOffset="191217.387">24747 12488 0,'0'0'16,"36"0"-16,-19-17 0,19 17 16,16 0-16,-34-18 15,17 18-15</inkml:trace>
-  <inkml:trace contextRef="#ctx0" brushRef="#br0" timeOffset="191684.2545">25083 13000 0,'0'0'0,"17"18"15,1-18-15,-18-36 16,0 19-16,0-19 16,0 1-16,0 0 15,-18-18-15,1-35 16,17 52-16,-18-69 16,18 52-16,0-18 15,18 53-15,-1 1 16,1 17-16,-1 0 0,36 0 15,-35 17-15,0 1 16,-18 17-16,0 1 16,0-19-16,0 19 15,0-19-15,0 1 16,0-1-16,0 1 16,17 0-16,1 17 15,0-17 1,-18-1-16,-18-17 15,0 0 1,1 0-16,-1 0 0,0-17 16,-17 17-1,0-18-15,17 18 0,1 0 16</inkml:trace>
+  <inkml:trace contextRef="#ctx0" brushRef="#br0" timeOffset="191217.3869">24747 12488 0,'0'0'16,"36"0"-16,-19-17 0,19 17 16,16 0-16,-34-18 15,17 18-15</inkml:trace>
+  <inkml:trace contextRef="#ctx0" brushRef="#br0" timeOffset="191684.2544">25083 13000 0,'0'0'0,"17"18"15,1-18-15,-18-36 16,0 19-16,0-19 16,0 1-16,0 0 15,-18-18-15,1-35 16,17 52-16,-18-69 16,18 52-16,0-18 15,18 53-15,-1 1 16,1 17-16,-1 0 0,36 0 15,-35 17-15,0 1 16,-18 17-16,0 1 16,0-19-16,0 19 15,0-19-15,0 1 16,0-1-16,0 1 16,17 0-16,1 17 15,0-17 1,-18-1-16,-18-17 15,0 0 1,1 0-16,-1 0 0,0-17 16,-17 17-1,0-18-15,17 18 0,1 0 16</inkml:trace>
   <inkml:trace contextRef="#ctx0" brushRef="#br0" timeOffset="191940.2034">25277 11977 0,'52'88'15,"-104"-176"-15,140 229 16,-53-18-16,0-70 15,1 71-15,-36-54 16,0-34-16,0 17 0,0-18 16,0 0-16,-18-17 15,0 35-15,1-53 16,-19 17-16</inkml:trace>
   <inkml:trace contextRef="#ctx0" brushRef="#br0" timeOffset="192885.6532">25947 12277 0,'0'0'0,"-18"0"0,18-18 16,-17 18-16,-19 0 15,19 18-15,-1 17 16,-17 18-16,17 0 15,0 35-15,18-35 16,18 35-16,0-53 16,35 36-1,-18-53-15,18-1 16,-18-17-16,0-17 16,1-1-16,17-35 15,-36 18-15,1-1 0,-1 1 16,-17 0-16,0-18 0,-17-35 15,-18 53-15,-36-54 16,36 54-16,-53 0 16,52 35-16,-17 17 15,36 1-15,-19 53 16,54-18 0,17 17-16,1-35 0,-1-17 15,18 17-15,-18-17 16,36 0-16,-54-18 15,19 0-15,-19 0 16</inkml:trace>
-  <inkml:trace contextRef="#ctx0" brushRef="#br0" timeOffset="193318.8281">26264 12665 0,'36'17'31,"-19"-17"-31,19 0 16,-19 0-16,18 0 15,-17 0-15,-18-17 16</inkml:trace>
+  <inkml:trace contextRef="#ctx0" brushRef="#br0" timeOffset="193318.828">26264 12665 0,'36'17'31,"-19"-17"-31,19 0 16,-19 0-16,18 0 15,-17 0-15,-18-17 16</inkml:trace>
   <inkml:trace contextRef="#ctx0" brushRef="#br0" timeOffset="193518.9852">26317 12594 0,'0'35'16,"-17"-17"-16,17 17 16,0 1-16,17 17 15,19-36-15,16 1 16,-34-1-16,53-17 15,-54 0-15,36-17 16,-18-1-16</inkml:trace>
   <inkml:trace contextRef="#ctx0" brushRef="#br0" timeOffset="193964.0024">26793 11853 0,'0'0'0,"0"36"15,-17 17-15,-1-36 16,18 18-16,0-17 0,0 0 16,0-1-16,18 1 15</inkml:trace>
-  <inkml:trace contextRef="#ctx0" brushRef="#br0" timeOffset="194109.1517">26952 11959 0,'0'71'15,"0"-142"-15,-17 159 0,-1-17 16</inkml:trace>
+  <inkml:trace contextRef="#ctx0" brushRef="#br0" timeOffset="194109.1516">26952 11959 0,'0'71'15,"0"-142"-15,-17 159 0,-1-17 16</inkml:trace>
   <inkml:trace contextRef="#ctx0" brushRef="#br0" timeOffset="197234.3908">14323 13070 0,'17'0'16,"36"0"0,-17 0-1,17 0-15,17 0 0,1-17 16,17 17-16,0 0 0,106-18 16,-123 18-16,52 0 15,-70 18-15,0-1 16</inkml:trace>
   <inkml:trace contextRef="#ctx0" brushRef="#br0" timeOffset="200292.8758">5398 13635 0,'0'18'15,"0"-1"-15,17 71 16,1-35-1,-18 0-15,17 0 0,1 18 16,17 52-16,-17-70 16,17 18-16,-17-54 15,0 1-15,-18-36 16,17-52 0,-17 34-1,0-52-15,0 35 16,0 0-16,-17-35 15,17 53-15,0-18 16,0 35-16,0 1 16,0 34-1,0 1-15</inkml:trace>
   <inkml:trace contextRef="#ctx0" brushRef="#br0" timeOffset="200831.4735">5874 14217 0,'-18'0'16,"0"-18"-16,1 1 16,-1 17-1,1 17 1,17 19 0,-18-19-16,18 19 15,0-1-15,18 0 16,-1-17-1,1-1-15,-1-17 16,19-35-16,-19 0 16,1 0-16,-18-1 0,18 1 15,-18 0-15,0-36 16,0 36-16,-18 0 0,18-1 16,-35 1-1,17 17-15,0 18 16,18 18-1,0 53 1,18-19-16,0-16 0,-1 17 16,1-18-16,35 36 15,-18-36-15,1-18 0,-1 1 16,-18 0-16,19-18 16,-19 0-16,1-18 0</inkml:trace>
   <inkml:trace contextRef="#ctx0" brushRef="#br0" timeOffset="201160.6115">6103 14005 0,'18'88'15,"-36"-176"-15,53 229 0,-17-88 0,17-17 16,-17-1-16,17 35 15,-35-52-15,18-18 0,-18 18 16,17-18 0,1-18-16,-18 0 0,0 1 15,18-1-15,-1 1 16,1 17 0,-18 17-1,-18 1 1,1-18-1,-19 0-15,19 0 0,-1 0 16,-17 0-16</inkml:trace>
-  <inkml:trace contextRef="#ctx0" brushRef="#br0" timeOffset="201488.4292">6844 14041 0,'35'0'16,"-17"17"-16,35-17 16,-18 0-16,0 0 15,1-17-15,-19 17 0,1 0 16</inkml:trace>
-  <inkml:trace contextRef="#ctx0" brushRef="#br0" timeOffset="201616.0264">6879 14199 0,'53'18'0,"-35"-18"15,17 0-15,-17 0 16,17 0-16,0 0 15</inkml:trace>
+  <inkml:trace contextRef="#ctx0" brushRef="#br0" timeOffset="201488.4291">6844 14041 0,'35'0'16,"-17"17"-16,35-17 16,-18 0-16,0 0 15,1-17-15,-19 17 0,1 0 16</inkml:trace>
+  <inkml:trace contextRef="#ctx0" brushRef="#br0" timeOffset="201616.0263">6879 14199 0,'53'18'0,"-35"-18"15,17 0-15,-17 0 16,17 0-16,0 0 15</inkml:trace>
   <inkml:trace contextRef="#ctx0" brushRef="#br0" timeOffset="202271.4428">8008 14764 0,'0'0'15,"-35"-18"-15,17 18 0,-17-35 16,0-36-16,-1-52 15,36 52-15,-17 1 0,17-89 16,0 71 0,17-53-16,1 88 15,0 0-15,17 0 16,-17 35-16,-1 18 16,1 0-16,-1 0 0,-17 18 0,18 0 15,-18 52 1,0-35-16,-18 36 15,18-53-15,0 17 0,18-18 16,17 1 0,-17-18-16,0 0 15,-1 18 1,-17-1-16,-17 1 0,-1 0 16,0-1-16,-17 19 0,0-19 15,-36 19-15,54-36 16,-19 17-1,36-34 1,18 17-16,35-36 16</inkml:trace>
-  <inkml:trace contextRef="#ctx0" brushRef="#br0" timeOffset="202805.0864">8608 13917 0,'0'0'0,"0"53"15,0-18-15,17 36 16,1-36-16,0 0 16,-1 1-16,1-1 15,35 0-15,-35-35 16,-1 18-16,1-36 16,-18-35-1,0 0-15,0 0 16,0 18-16,-18 0 0,18-53 15,0 52 1,0-34-16,0 52 16,0 36-1,18 35 1</inkml:trace>
+  <inkml:trace contextRef="#ctx0" brushRef="#br0" timeOffset="202805.0863">8608 13917 0,'0'0'0,"0"53"15,0-18-15,17 36 16,1-36-16,0 0 16,-1 1-16,1-1 15,35 0-15,-35-35 16,-1 18-16,1-36 16,-18-35-1,0 0-15,0 0 16,0 18-16,-18 0 0,18-53 15,0 52 1,0-34-16,0 52 16,0 36-1,18 35 1</inkml:trace>
   <inkml:trace contextRef="#ctx0" brushRef="#br0" timeOffset="203996.6467">9049 14235 0,'0'-18'16,"0"0"15,-18 18-31,0 0 16,-17 0 0,18 18-16,-1 0 15,0 17-15,1-17 16,17-1-16,0 36 15,17-35-15,1-1 16,17 1-16,-17-18 16,-1 0-16,19-18 0,-19 1 0,19-19 15,-36 1-15,17-18 16,-17 18-16,-17 0 16,-1-18-1,18 17-15,-18 1 16,1 18-16,-1-19 15,18 72 17,0 16-17,18-16-15,-18-1 0,35 36 16,-17-36-16,17 0 16,-17-17-16,-1-1 15,1-17-15,0 0 16,-1 0-16,1-17 0,-1 17 15</inkml:trace>
   <inkml:trace contextRef="#ctx0" brushRef="#br0" timeOffset="204363.1457">9243 13988 0,'0'53'15,"0"-106"-15,0 158 0,17-69 16,-17 34 0,18-17-16,0-17 15,-18-19-15,17-17 0,-17 18 16,18-18-16,-18-18 16,35-17-1,-17 17-15,-18 1 16,18 17-16,-1-18 0,1 18 15,-1 18-15,19-1 16,-19 1-16,1 35 16,-18-36-16,-18 1 15,1 0 1,-1-18-16,-17 0 16,17-18-16,-35 18 15,36-18-15,-1 18 0,0-17 16,1 17-16</inkml:trace>
   <inkml:trace contextRef="#ctx0" brushRef="#br0" timeOffset="205280.5589">6244 14252 0,'18'-17'16,"-1"17"-1,1 0-15,17-18 16,-17 18-16,17 18 15,-17-1-15,0-17 0,-18 18 16,17 0-16,-17 17 16,-17-18-16,-1-17 15,0 18-15,1 0 16,-19-18-16,19 0 16,-1 0-1,0 0-15,1 17 63</inkml:trace>
   <inkml:trace contextRef="#ctx0" brushRef="#br0" timeOffset="205531.6135">6227 14235 0,'0'17'31,"0"1"-31,17 35 15,-17-36-15,0 1 16,18 17-16,-1-17 0,1 0 16,-18-1-16</inkml:trace>
   <inkml:trace contextRef="#ctx0" brushRef="#br0" timeOffset="206161.1511">10336 14111 0,'18'0'0,"17"0"16,1 0-1,34-18-15,-35 18 16,18-17-16,0 17 16,-17 0-16,-19 0 15</inkml:trace>
-  <inkml:trace contextRef="#ctx0" brushRef="#br0" timeOffset="206315.3734">10583 13970 0,'18'71'16,"-36"-142"-16,36 194 0,17-52 15,-17-36-15,35 18 16,-36-17-16,19-19 0</inkml:trace>
-  <inkml:trace contextRef="#ctx0" brushRef="#br0" timeOffset="206777.3924">11959 13670 0,'-17'-17'15,"34"34"-15,-52-34 0,17 17 16,18 35-16,-17 0 16,17 18-16,-18 88 15,18-53-15,18 53 16,-18-70-16,35 35 15,0-53-15,0 0 16,1-36-16,17-34 16</inkml:trace>
+  <inkml:trace contextRef="#ctx0" brushRef="#br0" timeOffset="206315.3733">10583 13970 0,'18'71'16,"-36"-142"-16,36 194 0,17-52 15,-17-36-15,35 18 16,-36-17-16,19-19 0</inkml:trace>
+  <inkml:trace contextRef="#ctx0" brushRef="#br0" timeOffset="206777.3923">11959 13670 0,'-17'-17'15,"34"34"-15,-52-34 0,17 17 16,18 35-16,-17 0 16,17 18-16,-18 88 15,18-53-15,18 53 16,-18-70-16,35 35 15,0-53-15,0 0 16,1-36-16,17-34 16</inkml:trace>
   <inkml:trace contextRef="#ctx0" brushRef="#br0" timeOffset="206967.1879">12188 13811 0,'0'0'0,"0"53"16,18 0-16,0 0 0,-1 70 15,1-70 1,-18 0-16,18-17 0,-1-1 16,1 0-16,0 0 0,17-17 15</inkml:trace>
-  <inkml:trace contextRef="#ctx0" brushRef="#br0" timeOffset="207126.8014">12488 14058 0,'18'0'0,"17"0"15,-17-17-15,35 17 16,-36 0-16,19 0 15,-19 17-15</inkml:trace>
-  <inkml:trace contextRef="#ctx0" brushRef="#br0" timeOffset="207556.331">12876 14552 0,'18'35'16,"-36"-70"-16,54 70 0,-36-70 16,0-18-1,0 18-15,0-18 0,0-35 16,0 35-16,0-53 16,0 53-16,0-35 15,0 70-15,17 1 16,1 17-1,17 17-15,-35 1 16,18 35-16,0-36 16,-18 36-16,17-53 15,-17 36 1,0-19-16,0 1 16,18-18-1,-18 18-15,17-1 16,-17 1-1,-17-18 1,-1 0 0,1 0-16,-19 0 15,19-18-15</inkml:trace>
-  <inkml:trace contextRef="#ctx0" brushRef="#br0" timeOffset="207800.3716">13053 13705 0,'17'18'16,"19"53"0,-1-36-16,53 53 15,-53-35-15,1 0 0,-19 0 16,1-18-16,0 53 15,-18-52-15,-36 34 16,19-52-16,-19-1 16,-16 19-16,34-19 15,0-17-15,1 0 16</inkml:trace>
+  <inkml:trace contextRef="#ctx0" brushRef="#br0" timeOffset="207126.8013">12488 14058 0,'18'0'0,"17"0"15,-17-17-15,35 17 16,-36 0-16,19 0 15,-19 17-15</inkml:trace>
+  <inkml:trace contextRef="#ctx0" brushRef="#br0" timeOffset="207556.3309">12876 14552 0,'18'35'16,"-36"-70"-16,54 70 0,-36-70 16,0-18-1,0 18-15,0-18 0,0-35 16,0 35-16,0-53 16,0 53-16,0-35 15,0 70-15,17 1 16,1 17-1,17 17-15,-35 1 16,18 35-16,0-36 16,-18 36-16,17-53 15,-17 36 1,0-19-16,0 1 16,18-18-1,-18 18-15,17-1 16,-17 1-1,-17-18 1,-1 0 0,1 0-16,-19 0 15,19-18-15</inkml:trace>
+  <inkml:trace contextRef="#ctx0" brushRef="#br0" timeOffset="207800.3715">13053 13705 0,'17'18'16,"19"53"0,-1-36-16,53 53 15,-53-35-15,1 0 0,-19 0 16,1-18-16,0 53 15,-18-52-15,-36 34 16,19-52-16,-19-1 16,-16 19-16,34-19 15,0-17-15,1 0 16</inkml:trace>
   <inkml:trace contextRef="#ctx0" brushRef="#br0" timeOffset="209062.2305">12876 13970 0,'18'18'31,"0"-18"-31,-1 0 16,-17-18 31,0 0-31,0 1-16,0-19 15,0 19 1,0-18-16,18 17 15,0 18 1,-1 0 0,1 18-1,0-1 1,-1-17-16,-17 18 16,0-1-16,18 1 0,-18 0 15,0-1-15,-18 1 16,1 0-16,-1-18 15,0 0 1,1 0 0,-1 0-16,0 17 15,36-17 1</inkml:trace>
   <inkml:trace contextRef="#ctx0" brushRef="#br0" timeOffset="209818.5404">14146 14111 0,'-17'-35'0,"-1"17"15,-17 1 1,0-1-16,17 0 15,-17 18-15,-1 0 0,1 0 0,0 0 16,17 18-16,-17-18 0,-18 53 16,35-18-16,1 18 15,17-35-15,0 35 16,17-18-16,1-35 16,0 18-16,-1-18 15,36 0-15,-18-18 16,18-35-16,-35 18 15,0-36 1,-1 18-16,-17-35 16,0 53-16,0-18 15,-17 18-15,17-1 0,-18-17 0,0 18 16,-17-35-16,17 52 16,1-17-16,17 52 15,0 36 1,0-18-16,17 89 15,1-54-15,53 36 16,-36-53-16,35 18 16,-52-54-16,53 19 15,-54-19-15,19-17 16,-19 0-16</inkml:trace>
   <inkml:trace contextRef="#ctx0" brushRef="#br0" timeOffset="210275.1461">14270 13723 0,'18'106'16,"-18"-53"-16,35 53 15,-18-53-15,1 35 16,0-53 0,-1 0-16,-17-17 15,18-36 1,17-35-1,1 18 1,-1 17-16,-18 18 0,19 0 16,34 18-16,-34 0 15,-1 17-15,-35 0 16,0 1-16,0-19 16,-18 1-16,1 0 15,-19-1-15,1-17 0,-36 18 16,36-18-16,-18-18 15,36 1-15,-1-1 16,0 0 0</inkml:trace>
@@ -335,10 +331,10 @@
   <inkml:trace contextRef="#ctx0" brushRef="#br0" timeOffset="237141.1732">16140 16616 0,'53'0'15,"-18"0"-15,53-18 16,-53 1-16,53-1 15,-70 18-15,0 0 16,-1 0 0</inkml:trace>
   <inkml:trace contextRef="#ctx0" brushRef="#br0" timeOffset="237809.3448">17145 16228 0,'18'17'0,"-18"1"16,0 35-16,0 70 15,-18-70-15,0 18 0,-35 35 16,18-53-16,-35 35 15,34-70 1,-34-1-16,35-17 16,-18-17-16,35-19 15,0-34-15,36 34 16,17-34-16,1 52 16,34-17-1,-17 35-15,35 18 16,-35 17-16,35 35 15,-52-52-15,34 53 16,-52-54-16,-1 19 16,1-19-16,-18 1 0,0 17 15,-18-35 1</inkml:trace>
   <inkml:trace contextRef="#ctx0" brushRef="#br0" timeOffset="239309.9077">17586 16122 0,'18'0'16,"-1"53"-16,1-18 15,35 106-15,-36-53 16,36 54-16,-35-72 16,35 36-16,-35-53 15,-1-18-15,36-17 16,-35-18-16,17-18 16,-35-17-16,18 0 15,-18-54-15,0 36 16,0 18-16,-18-88 15,18 70-15,-18 0 0,1-53 16,17 71-16,0-18 16,0 35-1,-18 36 1</inkml:trace>
-  <inkml:trace contextRef="#ctx0" brushRef="#br0" timeOffset="239893.9295">18433 16704 0,'-18'-18'0,"-17"1"16,-1 17-1,-16 17 1,16 36-16,19 0 15,17-17-15,17 16 16,-17-34-16,18 0 16,35 17-16,-18-35 15,-17 0-15,-1 0 0,1 0 16,35-18-16,-53 1 16,18-36-1,-18 18-15,0-54 16,-18 54-16,0-53 15,1 35-15,-19-35 16,19 70-16,-19-17 16,19 35-16,-1 17 15,18 19-15,0 34 16,0-17-16,35 35 16,-17-52-16,53 52 15,-36-53-15,53 18 16,-53-35-1,18-1-15,-35 1 16,0-18-16</inkml:trace>
+  <inkml:trace contextRef="#ctx0" brushRef="#br0" timeOffset="239893.9294">18433 16704 0,'-18'-18'0,"-17"1"16,-1 17-1,-16 17 1,16 36-16,19 0 15,17-17-15,17 16 16,-17-34-16,18 0 16,35 17-16,-18-35 15,-17 0-15,-1 0 0,1 0 16,35-18-16,-53 1 16,18-36-1,-18 18-15,0-54 16,-18 54-16,0-53 15,1 35-15,-19-35 16,19 70-16,-19-17 16,19 35-16,-1 17 15,18 19-15,0 34 16,0-17-16,35 35 16,-17-52-16,53 52 15,-36-53-15,53 18 16,-53-35-1,18-1-15,-35 1 16,0-18-16</inkml:trace>
   <inkml:trace contextRef="#ctx0" brushRef="#br0" timeOffset="240356.5076">18680 16457 0,'0'0'16,"0"-18"-16,17 36 15,-17 53 1,18-18-16,-18 35 16,18-35-16,-18-18 15,17 18-15,1 0 16,-1-36-16,1 1 16,0-36-1,-1-17-15,1 18 16,0-1-16,-1 0 15,19 18-15,-19 0 16,1 36-16,-18-1 16,0 0-16,-18-17 15,1-1-15,-19 19 16,1-36-16,-18 0 16,35 0-16,-17-18 15,18 0-15,17 1 0,-18-1 16</inkml:trace>
   <inkml:trace contextRef="#ctx0" brushRef="#br0" timeOffset="269285.9538">17956 9384 0,'-17'0'16,"-1"18"-16,18-36 78,0 0-63,0 1-15,18-36 16,-18 17 0,35-69-16,-17 34 0,-1 0 15,19-70 1,-19 53-16,1-88 15,0 88-15,-18-1 0,17 19 16,1-54 0,-18 71-16,0 1 0,17 16 15,-17 1-15,0 0 16,0 17-16,0 0 16,0 1-16,0 34 78</inkml:trace>
-  <inkml:trace contextRef="#ctx0" brushRef="#br0" timeOffset="269591.6584">17956 7973 0,'0'0'16,"0"-35"-16,0 17 0,0-35 15,18 18-15,-18 17 16,18-17-16,17-18 16,-35 35-16,18 1 15,-1-1-15,1-17 16,0 17-16,-1 18 15,1 18 1,-18 35-16,0-36 16,17 71-16,-17-52 15,0-1-15,0-17 0,18-1 16,-18 1-16,18 0 16,-1-1-16,-17 1 0,36 17 15</inkml:trace>
+  <inkml:trace contextRef="#ctx0" brushRef="#br0" timeOffset="269591.6583">17956 7973 0,'0'0'16,"0"-35"-16,0 17 0,0-35 15,18 18-15,-18 17 16,18-17-16,17-18 16,-35 35-16,18 1 15,-1-1-15,1-17 16,0 17-16,-1 18 15,1 18 1,-18 35-16,0-36 16,17 71-16,-17-52 15,0-1-15,0-17 0,18-1 16,-18 1-16,18 0 16,-1-1-16,-17 1 0,36 17 15</inkml:trace>
   <inkml:trace contextRef="#ctx0" brushRef="#br0" timeOffset="270052.481">18221 7902 0,'18'18'16,"-1"0"-16,1 52 15,0-17-15,-1-18 16,36 89-16,-35-71 16,17 88-1,0 0-15,-35-71 16,18 1-16,0 0 15,-1-19-15,1 1 0,-1 18 16,1-53-16,0-1 0,-1 1 16,-17-1-16,18-17 15,-18-17 1</inkml:trace>
   <inkml:trace contextRef="#ctx0" brushRef="#br0" timeOffset="270319.1855">18450 8855 0,'0'17'16,"0"1"-16,18 17 15,0 1-15,-1 34 16,18 18 0,-17-52-16,-18-1 0,18-17 0,-1-1 15,19 1-15,-19-18 16,1 0-1,-18-18-15,18 1 16,-1-19-16,-17 1 0,0 17 16,0-17-16,0 0 0,0-36 15,0 54-15,0-1 16</inkml:trace>
   <inkml:trace contextRef="#ctx0" brushRef="#br0" timeOffset="270664.3603">18609 9119 0,'0'0'15,"0"-17"1,35-36-16,-35 17 16,18-16-16,0-54 15,-18 53-15,17-71 16,-17 54-16,0-89 16,0 88-16,0-52 15,0 70-15,18-35 16,-18 53-16,18-18 15,-18 35 1,17 0-16</inkml:trace>
@@ -360,19 +356,19 @@
   <inkml:trace contextRef="#ctx0" brushRef="#br2" timeOffset="312795.6754">9208 4745 0,'35'18'15,"-18"-1"1,1 1-16,53-1 15,-36 1-15,0 0 0,36-1 16,-54-17-16,19 18 16,-19-18-16,-17 18 15,18-1-15,-18 1 16,-18 0 0,1-18-1,-1 17-15,0-17 16,1 0-16,-1 18 0,0-18 15,1 17-15,17 1 16,-18 0-16,18 35 16,0-36-16,0 1 0,0 0 15</inkml:trace>
   <inkml:trace contextRef="#ctx0" brushRef="#br2" timeOffset="313384.9746">9684 5009 0,'0'0'16,"17"0"-1,19-35 1,17 35-16,35-53 15,-18 18 1,54-18-16,-54 18 16,54 0-16,-71 17 15,53 0 1,-71 1-16,0 17 0,-17 0 16,-1-18-16,-34 18 31,-1 18-31,1-18 15,-1 0 1</inkml:trace>
   <inkml:trace contextRef="#ctx0" brushRef="#br2" timeOffset="313664.429">10336 4657 0,'18'0'16,"17"0"-16,-17-18 0,53 0 16,-36 18-16,35 0 15,-34 18-15,17 0 16,-36-1 0,1-17-16,-1 18 15,-17 0-15,0-1 16,-17-17-16,-1 18 0,1 0 15,-1-18-15,0 17 0,1 1 16,-1-18-16,36 0 16</inkml:trace>
-  <inkml:trace contextRef="#ctx0" brushRef="#br2" timeOffset="314313.7577">10848 4763 0,'18'0'125,"-1"0"-109,1 0-1,-1 17-15,36-17 16,-35 18 0,70-18-16,-52 0 15,16 17-15,72 1 16,-71-18-16,0 0 0,0 18 16,0-18-16,-18 0 15,18 0-15,-36 0 0,19 0 16,-1 0-16,-17 0 0,-1 0 15,1 0-15,0-18 16,-18 0 31</inkml:trace>
-  <inkml:trace contextRef="#ctx0" brushRef="#br2" timeOffset="314671.1561">11642 4763 0,'17'0'16,"19"0"-1,-1 17 1,0-17-16,0 18 0,-17-1 15,53 1-15,-36-18 16,35 18-16,-52-1 16,35 1-1,-35-18-15,-1 0 0,-17 18 16,0-1 0,-17 1-1,-1-18-15,0 18 16,1-1-16,-1-17 15,18 18-15,-18-1 16,18 1 0,-17-18-16</inkml:trace>
+  <inkml:trace contextRef="#ctx0" brushRef="#br2" timeOffset="314313.7576">10848 4763 0,'18'0'125,"-1"0"-109,1 0-1,-1 17-15,36-17 16,-35 18 0,70-18-16,-52 0 15,16 17-15,72 1 16,-71-18-16,0 0 0,0 18 16,0-18-16,-18 0 15,18 0-15,-36 0 0,19 0 16,-1 0-16,-17 0 0,-1 0 15,1 0-15,0-18 16,-18 0 31</inkml:trace>
+  <inkml:trace contextRef="#ctx0" brushRef="#br2" timeOffset="314671.156">11642 4763 0,'17'0'16,"19"0"-1,-1 17 1,0-17-16,0 18 0,-17-1 15,53 1-15,-36-18 16,35 18-16,-52-1 16,35 1-1,-35-18-15,-1 0 0,-17 18 16,0-1 0,-17 1-1,-1-18-15,0 18 16,1-1-16,-1-17 15,18 18-15,-18-1 16,18 1 0,-17-18-16</inkml:trace>
   <inkml:trace contextRef="#ctx0" brushRef="#br2" timeOffset="315586.7137">12136 4886 0,'17'-18'47,"36"1"-32,-35 17-15,17-18 0,0 0 16,1 18-16,52-17 16,-35-1-16,0 18 15,35-17-15,-35-1 16,35 0-16,-53 1 15,18-1-15,-35 18 16,17-18 0,-53 18 31</inkml:trace>
   <inkml:trace contextRef="#ctx0" brushRef="#br2" timeOffset="315916.0697">12700 4621 0,'0'0'0,"18"-17"31,-1 17-16,1 0-15,0 0 16,17 0-16,-18 0 0,19 17 0,-19-17 16,36 0-1,-35 0-15,17 0 16,-17 18-16,-36 0 47,1-1-47,-1 1 15,0 0 1,18-1-16,-17-17 16,17 18-16,-18-18 15</inkml:trace>
   <inkml:trace contextRef="#ctx0" brushRef="#br2" timeOffset="316730.2131">13088 4727 0,'-18'-17'16,"1"17"-16,-1 0 15,36 0 16,-1 0-15,1 0 0,0 0-16,-1 0 15,19 0-15,-19 0 16,1 0-16,52 0 16,-34 17-16,87-17 15,-70 0-15,88 18 16,-70-18-16,52 18 15,-70-18-15,35 0 16,-52 0-16,-1 17 16,-53-34 15,1 17-15,17-18-16,-36 18 15,36-18-15</inkml:trace>
-  <inkml:trace contextRef="#ctx0" brushRef="#br2" timeOffset="317090.1628">13758 4639 0,'-17'-18'16,"17"36"15,17-18-15,1 18-16,17-1 16,-17-17-16,0 18 15,17 0-15,-18-1 0,1-17 16,17 36-16,-35-19 15,0 1 1,-17-18-16,-1 17 16,-35 19-1,36-36-15,-19 17 16,19-17-16,-1 18 0</inkml:trace>
-  <inkml:trace contextRef="#ctx0" brushRef="#br2" timeOffset="317783.658">14164 4780 0,'0'0'16,"18"0"30,-1 0-30,1-17 0,0 17-16,-1 0 0,19 0 0,-1-18 15,0 18-15,71-18 16,-36 18-16,-17 0 16,0-17-16,53 17 15,0-18 1,-71 18-16,-17 0 0,0 0 15,-1-18-15,-34 18 16,-19 0 0,19 0-16,-1 0 15</inkml:trace>
+  <inkml:trace contextRef="#ctx0" brushRef="#br2" timeOffset="317090.1627">13758 4639 0,'-17'-18'16,"17"36"15,17-18-15,1 18-16,17-1 16,-17-17-16,0 18 15,17 0-15,-18-1 0,1-17 16,17 36-16,-35-19 15,0 1 1,-17-18-16,-1 17 16,-35 19-1,36-36-15,-19 17 16,19-17-16,-1 18 0</inkml:trace>
+  <inkml:trace contextRef="#ctx0" brushRef="#br2" timeOffset="317783.6579">14164 4780 0,'0'0'16,"18"0"30,-1 0-30,1-17 0,0 17-16,-1 0 0,19 0 0,-1-18 15,0 18-15,71-18 16,-36 18-16,-17 0 16,0-17-16,53 17 15,0-18 1,-71 18-16,-17 0 0,0 0 15,-1-18-15,-34 18 16,-19 0 0,19 0-16,-1 0 15</inkml:trace>
   <inkml:trace contextRef="#ctx0" brushRef="#br2" timeOffset="318067.7294">14746 4586 0,'0'0'0,"18"0"15,17 0 1,-17 0-16,35 0 16,-36 0-16,1 0 15,0 18-15,-1-18 16,-17 17-1,0 1-15,0 17 16,-17-17 0,-1 0-16,18-1 15,0 1-15,-18-18 0,18 18 0,18-18 16</inkml:trace>
   <inkml:trace contextRef="#ctx0" brushRef="#br2" timeOffset="318480.9122">15028 4727 0,'18'0'31,"17"18"-15,1-18-16,-1 0 0,18 0 15,-18 0-15,0 0 16,-17 0-16,17 0 16,-35-18 15</inkml:trace>
   <inkml:trace contextRef="#ctx0" brushRef="#br2" timeOffset="318719.3101">15205 4604 0,'17'0'15,"1"17"1,17 1-16,1 17 15,-19-17-15,1 0 16,-1 17 0,-17-17-16,0-1 15,0 1-15,-17 17 16,-1-17-16,-17 17 0,17-17 16,1-1-16,-1 1 15,-17 17-15,-1-17 0</inkml:trace>
   <inkml:trace contextRef="#ctx0" brushRef="#br2" timeOffset="329785.033">6279 4833 0,'-17'0'0,"17"-18"15,0 1 1,-18 17-16,18-18 16,-17 18-16,-1 0 15,0 0 1,1 0 15,17-17-15,-18 17-1,0 0-15,1 0 16,-1 0 0,18 17-16,-18-17 0,1 18 15,17-1 1,17 1-1,19 0-15,34 17 16,-17-17 0,0 17-16,18-17 0,-1 17 15,1 0-15,88 36 16,-71-36-16,-18 0 0,1-17 16,70 17-1,-35 0-15,-71-35 0,-17 18 16,17-18-16,-17 18 15,-36-1 1,0-17 0</inkml:trace>
-  <inkml:trace contextRef="#ctx0" brushRef="#br2" timeOffset="330046.6623">7020 5027 0,'18'35'15,"0"-35"-15,-1 18 0,54 17 16,-54-17-16,54 17 16,-36-17-16,18 17 15,-53 0 1,0 1-16,0-19 15,-35 1-15,-36 17 16,-17 1-16,53-19 16,-18 1-16,0-18 0,18 0 15,-18 0-15</inkml:trace>
-  <inkml:trace contextRef="#ctx0" brushRef="#br2" timeOffset="330625.1451">5256 5803 0,'-17'18'15,"34"-36"-15,-34 18 16,52-35-1,-17 0-15,52-36 16,-17 36-16,-18-18 0,18 18 16,71-71-16,-54 53 15,71-71 1,-70 54-16,53-18 16,-89 52-16,0-17 15,-17 53-15,-36 0 16,-17 36-1</inkml:trace>
+  <inkml:trace contextRef="#ctx0" brushRef="#br2" timeOffset="330046.6622">7020 5027 0,'18'35'15,"0"-35"-15,-1 18 0,54 17 16,-54-17-16,54 17 16,-36-17-16,18 17 15,-53 0 1,0 1-16,0-19 15,-35 1-15,-36 17 16,-17 1-16,53-19 16,-18 1-16,0-18 0,18 0 15,-18 0-15</inkml:trace>
+  <inkml:trace contextRef="#ctx0" brushRef="#br2" timeOffset="330625.145">5256 5803 0,'-17'18'15,"34"-36"-15,-34 18 16,52-35-1,-17 0-15,52-36 16,-17 36-16,-18-18 0,18 18 16,71-71-16,-54 53 15,71-71 1,-70 54-16,53-18 16,-89 52-16,0-17 15,-17 53-15,-36 0 16,-17 36-1</inkml:trace>
   <inkml:trace contextRef="#ctx0" brushRef="#br2" timeOffset="330886.1831">5909 4886 0,'0'0'0,"18"18"15,-1-1 1,19 1-16,-19-18 0,71 18 16,-52-18-1,-1 0-15,18 0 0,-35 0 16,17 0-16,-18 17 16,1 1-16,-36 52 15,1-34-15,-1-1 16,1-17-16,-1 17 0,0 0 15,18-17-15,18 17 16</inkml:trace>
   <inkml:trace contextRef="#ctx0" brushRef="#br1" timeOffset="351746.0812">29069 1517 0,'0'-18'0,"-35"-17"15,17 17-15,-17 1 16,-1-1-16,-16 0 0,-1 1 0,0-1 15,0-17-15,-88 17 16,52 1-16,1 17 0,-123 0 16,-36 0-1,141 17-15,-88 19 16,106-19-16,-54 54 16,72-36-16,17 18 15,0-18-15,0 18 16,0-18-16,0 54 15,53-54-15,0 53 16,18-53-16,53 71 16,-19-71-16,1 18 15,36-17-15,87 17 16,-70-36-16,123 36 16,-105-18-16,17-17 0,0 0 15,141-1-15,-141-17 16,0 0-16,124-35 15,-142 0-15,-17 17 0,53-52 16,-106 17 0,0-36-16,-53 37 15,-36-72-15,-16 54 16,-72-54-16,36 71 16,-106-53-1,88 71-15,-88-18 0,88 53 16,18 0-1,0 0-15,17 0 0</inkml:trace>
   <inkml:trace contextRef="#ctx0" brushRef="#br1" timeOffset="353242.2254">27040 2064 0,'18'0'46,"-18"17"1,0 1-31,0 0-16,0-1 16,0 1-16,18 0 15,-18-1-15,0 1 0,0 35 16,17-36-16,-17 54 15,18-36-15,0 36 16,-1-18 0,19 17-16,-19-34 15,36 34-15,-18-35 16,1 1-16,-1-1 0,0 0 16,71 36-1,-71-36-15,71 18 16,-53-18-16,53 1 15,-36-19-15,72 18 16,-72-35-16,107 18 16,-107-18-16,106 0 15,-87-18-15,-19 18 16,1-17-16,52-1 16,-52 18-16,-18-17 15,0-1-15,0 0 0,-1-17 0,-16 17 16,17-17-16,52-35 15,-52 17-15,0 0 16,0 0-16,18-53 16,-36 35-16,18-17 15,-53 35-15,18-17 16,-18 34-16,0-16 16,0 34-16,0 0 15,0 1-15,17-19 16,-17 19-16,0-1 15</inkml:trace>
@@ -380,17 +376,17 @@
   <inkml:trace contextRef="#ctx0" brushRef="#br1" timeOffset="354439.0164">27270 2787 0,'17'0'15,"1"0"-15,0 0 16,-1 0-1,19 0 1,16 18 0,-16-1-16,70 19 15,-36-19-15,89 18 16,-71 1-16,141-1 16,-123-35-16,124 18 15,-107-18-15,36-18 16,-89 0-1,36 1-15,-71-1 16,1 0-16,-19 18 16,-17-17-16,0-1 15,-17 1-15,-1 17 0,18-18 16,-35 18-16</inkml:trace>
   <inkml:trace contextRef="#ctx0" brushRef="#br1" timeOffset="354878.0445">27252 2381 0,'53'0'15,"18"18"1,-19-18-16,72 35 16,-53-17-16,-1 17 0,18 0 15,18-17-15,106 53 16,-89-36-16,124-18 16,-106 1-16,-17-18 0,-1-18 15,-17 1-15,-18-1 0,0-17 16,-52 17-1,-36-35-15</inkml:trace>
   <inkml:trace contextRef="#ctx0" brushRef="#br1" timeOffset="355861.9745">27834 1411 0,'-17'0'16,"-1"0"-1,18 18-15,-35-1 16,17 19 0,0-19-16,18 1 0,-53 53 15,36-19-15,-36 72 16,18-54-16,-1 54 16,19-71-16,17 35 15,-18-53 1,18 18-16</inkml:trace>
-  <inkml:trace contextRef="#ctx0" brushRef="#br1" timeOffset="356523.1678">28099 1411 0,'0'18'31,"-18"17"-31,0 0 16,1 18-16,-1 53 16,18-53-16,-35 70 15,0-52-15,17-18 16,0-18-16,1 18 0,17-18 0,-18 18 15,18-35 1,0 0-16,0-1 16</inkml:trace>
+  <inkml:trace contextRef="#ctx0" brushRef="#br1" timeOffset="356523.1677">28099 1411 0,'0'18'31,"-18"17"-31,0 0 16,1 18-16,-1 53 16,18-53-16,-35 70 15,0-52-15,17-18 16,0-18-16,1 18 0,17-18 0,-18 18 15,18-35 1,0 0-16,0-1 16</inkml:trace>
   <inkml:trace contextRef="#ctx0" brushRef="#br1" timeOffset="356862.5818">28469 1411 0,'0'0'0,"0"53"16,0-18-16,-17 54 16,-1-19-16,-35 54 15,18-54-15,-18 71 16,35-88 0,-17 35-16,35-52 15,0-19-15,0 1 0,18-18 16</inkml:trace>
-  <inkml:trace contextRef="#ctx0" brushRef="#br1" timeOffset="357085.3407">28804 1517 0,'0'35'16,"-17"1"-16,-36 52 16,17-35-16,-16 70 15,34-70-15,-17 35 16,17-53-16,18 18 16,0-35-1</inkml:trace>
+  <inkml:trace contextRef="#ctx0" brushRef="#br1" timeOffset="357085.3406">28804 1517 0,'0'35'16,"-17"1"-16,-36 52 16,17-35-16,-16 70 15,34-70-15,-17 35 16,17-53-16,18 18 16,0-35-1</inkml:trace>
   <inkml:trace contextRef="#ctx0" brushRef="#br1" timeOffset="357274.5685">29192 1764 0,'18'70'16,"-36"-140"-16,36 193 0,-18-87 0,-18 69 15,18-69-15,-17 17 16,17-18-16,-36 36 16</inkml:trace>
   <inkml:trace contextRef="#ctx0" brushRef="#br1" timeOffset="358353.4956">27252 1993 0,'0'0'0,"18"-17"0,35-36 16,-18 17-16,35 1 15,-34 0-15,87 0 16,-35 17-16,106 0 16,-88 1-16,177-1 15,-142 18 1,141 18-16,-141-1 16,53 36-16,-141-18 15,-18 1-15,0-1 0,-35 0 16</inkml:trace>
-  <inkml:trace contextRef="#ctx0" brushRef="#br1" timeOffset="359064.7028">27746 2134 0,'18'-17'0,"-1"17"15,19 0-15,34-18 16,-35 18-16,106-18 15,-70 18-15,35 0 0,88 0 16,-71 0-16,-17 18 16,106 35-1,-124-18-15,-35 1 0,0-1 16,-18-18-16,0 19 0</inkml:trace>
+  <inkml:trace contextRef="#ctx0" brushRef="#br1" timeOffset="359064.7027">27746 2134 0,'18'-17'0,"-1"17"15,19 0-15,34-18 16,-35 18-16,106-18 15,-70 18-15,35 0 0,88 0 16,-71 0-16,-17 18 16,106 35-1,-124-18-15,-35 1 0,0-1 16,-18-18-16,0 19 0</inkml:trace>
   <inkml:trace contextRef="#ctx0" brushRef="#br1" timeOffset="365426.988">14235 11712 0,'17'-17'16,"-17"34"15,0 1-31,0 0 15,-17 52-15,17-35 16,-36 54 0,19-37-16,-36 54 15,17-18-15,-34 71 16,35-53-16,-54 88 16,37-88-16,-37 88 15,54-106-15,-53 71 16,53-71-16,-36 53 15,36-70-15,-18 52 16,18-52-16,17-18 16,-35 70-16,0-35 15,35-35-15,-17-17 16,0 16 0,17-16-16,1-1 0,17-17 15,0 52-15,0-52 16,35 35-16,0-53 15,36 35-15,-36-35 16,88 0 0,-70 18-16,18-18 0,17 0 15,-17 0-15,105 0 16,-70 0-16,106 0 16,-107-18-16,125 0 15,-124 1-15,70-36 16,-88 18-16,53-18 15,-88 35-15,0 0 16,0-17-16,-35 35 16,-18-18-16,35 1 15,-17-36 1,-18 35-16,17-17 0,18-141 16,1 17-1,-19 71-15,19-142 16,-19 89-16,1 18 15,35-159-15,-35 140 16,34-87 0,-34 141-16,17-53 15,-35 88-15,18-18 16,0 36-16,-18 0 16,0 17-16,0-17 15,-36 0-15,-34-1 16,-1 19-16,-17-1 0,-106-17 15,53 35-15,-141 0 16,141 17-16,-159 36 16,176-17-16,-17 17 15,106-18-15</inkml:trace>
   <inkml:trace contextRef="#ctx0" brushRef="#br1" timeOffset="366011.1033">14411 14781 0,'-18'36'16,"36"-72"-16,-36 89 0,18 36 16,0-37-16,36 54 15,-1-70 1,18 52-16,-18-53 16,53 0-16,18-17 15,0-18 1,-53 0-16,-18-18 15,53-35 1,-70 18-16</inkml:trace>
   <inkml:trace contextRef="#ctx0" brushRef="#br1" timeOffset="366300.275">14111 15028 0,'35'-35'16,"1"0"-16,-1 17 15,53-52 1,-35 34-16,-18-17 0,1 18 16,-1 0-16,-17 0 0,17-1 15,-18 1-15,-17 17 16,18 18-16,0 18 15,-1 35 1,19-35 0,17 34-16,-18-16 15,35-19-15</inkml:trace>
   <inkml:trace contextRef="#ctx0" brushRef="#br1" timeOffset="367030.8383">15716 14958 0,'-35'-35'16,"70"70"-16,-105-70 0,34 35 15,1 17-15,-18 36 16,36-35-16,-36 70 16,53-53-16,-18 36 15,18-36-15,35 0 16,-17-35-16,53 0 15,-36 0-15,18-35 16,-36 0-16,19 17 16,-19-52-1,-17 52-15,18-17 0,-18 17 16,0-17-16,-18 52 31,18 36-15,18-35-16,0 35 15,-1-36-15,36 19 16,-35-19-16,35 1 16,-18-18-16</inkml:trace>
-  <inkml:trace contextRef="#ctx0" brushRef="#br1" timeOffset="367256.612">16087 14887 0,'-36'0'15,"72"0"-15,-89 18 0,35 17 0,-17 36 16,17-36-16,18 0 16,0 36-16,0-54 15,53 36 1,-18-53-16,-17 18 0,17-18 15,1 0-15,17-18 16</inkml:trace>
+  <inkml:trace contextRef="#ctx0" brushRef="#br1" timeOffset="367256.6119">16087 14887 0,'-36'0'15,"72"0"-15,-89 18 0,35 17 0,-17 36 16,17-36-16,18 0 16,0 36-16,0-54 15,53 36 1,-18-53-16,-17 18 0,17-18 15,1 0-15,17-18 16</inkml:trace>
   <inkml:trace contextRef="#ctx0" brushRef="#br1" timeOffset="367534.2217">16387 14923 0,'-18'0'16,"36"0"-16,-54 17 0,19 18 16,-1 1-16,0 17 15,18-18-15,0-17 16,18 34-1,0-34-15,17 0 16,-17-1-16,-1-17 0,18 0 16,-17 0-16,0 0 15</inkml:trace>
   <inkml:trace contextRef="#ctx0" brushRef="#br1" timeOffset="367936.1863">16633 15099 0,'0'0'16,"18"18"-16,0-18 0,-1 17 0,19-17 15,-19 0 1,1-17-16,0 17 0,-1-18 15,1 0-15,0-17 16,-18 17-16,-18 1 16,0-1-16,-35 0 15,18 18 1,17 18-16,1-18 16,17 18-16,-18 17 15,18 0-15,0-17 16,18 17-16,-1-17 0,1 17 0,0-17 15,52 17-15,-52-35 16,52 18 0,-34-18-16,17-18 15,-18 18-15,-17-18 0,-1 1 16</inkml:trace>
   <inkml:trace contextRef="#ctx0" brushRef="#br1" timeOffset="368201.6964">16951 14464 0,'0'18'16,"18"70"-1,-18-35-15,17 0 0,1-1 16,-18 19-16,18 53 16,-18-72-16,17 1 15,-17-17-15,18-1 0,-1 0 16,1 0-16,0-35 16,-1 0-16</inkml:trace>
@@ -404,8 +400,8 @@
   <inkml:trace contextRef="#ctx0" brushRef="#br1" timeOffset="383096.9639">9525 15081 0,'18'36'0,"-18"-1"16,17 53-16,1-53 15,0 36-15,-1-36 16,18 0-16,-17-35 15,-18 18 1,0-36-16,18-17 16,-18 17-16,-18-34 15,18 16-15,0 1 16,0 0-16,0-1 0,0-16 16,18 34-16,-1 0 15</inkml:trace>
   <inkml:trace contextRef="#ctx0" brushRef="#br1" timeOffset="383433.9232">9790 15258 0,'17'0'16,"1"0"-1,0 0-15,17-18 16,-35 0-16,17 1 16,-17-1-16,0 0 0,-17 1 15,-1 17 1,1 0-16,-19 17 16,36 1-16,-17 35 15,17 0 1,17 0-16,19-53 15,16 17-15,-34-17 16,17 0-16,-17 0 0,17-17 16,-17-1-16,0 1 15,-1 17 1,-17-18-16</inkml:trace>
   <inkml:trace contextRef="#ctx0" brushRef="#br1" timeOffset="383723.4449">10072 14799 0,'0'35'0,"17"-17"16,1 70-1,-18-35-15,18-18 0,-1 54 16,-17-54-16,0 0 16,18 0-16,-18 18 15,0-35-15</inkml:trace>
-  <inkml:trace contextRef="#ctx0" brushRef="#br1" timeOffset="383985.3669">10248 15205 0,'0'0'15,"0"35"-15,0-17 16,18-1-16,-1-17 15,19 0-15,-19 0 16,1-17-16,0 17 0,-18-18 16,17-17-1,-17 17-15,-17 0 16,-1 1-16,-17 17 16,17-18-16,0 18 15,1 0-15,-1 18 16</inkml:trace>
-  <inkml:trace contextRef="#ctx0" brushRef="#br1" timeOffset="384313.0568">10548 15099 0,'0'18'16,"-18"-1"-16,18 18 15,0-17 1,0 17-16,18-17 15,-18 0-15,35 17 16,-17-17-16,17-18 16,-17 0-1,0-18 1,-18 0-16,0 1 16</inkml:trace>
+  <inkml:trace contextRef="#ctx0" brushRef="#br1" timeOffset="383985.3668">10248 15205 0,'0'0'15,"0"35"-15,0-17 16,18-1-16,-1-17 15,19 0-15,-19 0 16,1-17-16,0 17 0,-18-18 16,17-17-1,-17 17-15,-17 0 16,-1 1-16,-17 17 16,17-18-16,0 18 15,1 0-15,-1 18 16</inkml:trace>
+  <inkml:trace contextRef="#ctx0" brushRef="#br1" timeOffset="384313.0567">10548 15099 0,'0'18'16,"-18"-1"-16,18 18 15,0-17 1,0 17-16,18-17 15,-18 0-15,35 17 16,-17-17-16,17-18 16,-17 0-1,0-18 1,-18 0-16,0 1 16</inkml:trace>
   <inkml:trace contextRef="#ctx0" brushRef="#br1" timeOffset="384424.1337">10707 15222 0,'17'36'16,"-34"-72"-16,34 89 0,1-35 0,0 0 15</inkml:trace>
   <inkml:trace contextRef="#ctx0" brushRef="#br1" timeOffset="384579.5393">10724 15046 0,'0'18'31,"36"-18"-15</inkml:trace>
   <inkml:trace contextRef="#ctx0" brushRef="#br1" timeOffset="384739.8404">10866 15134 0,'0'0'15,"35"-17"-15,-18-1 0,19 0 16,-19 18-16</inkml:trace>
@@ -431,11 +427,11 @@
   <inkml:trace contextRef="#ctx0" brushRef="#br1" timeOffset="405752.0045">4674 15540 0,'18'0'15,"0"0"-15</inkml:trace>
   <inkml:trace contextRef="#ctx0" brushRef="#br1" timeOffset="406245.9938">4674 15540 0,'71'0'15,"-142"0"-15,142-18 0,-89 18 16,18-17 0,0-1-16,0 0 15,18 1 1,-18-1-16,18 0 15,-1-17-15,-17 17 16,18 18 0,-1 0-1,-17 18 1,18-18 15,-36 0 16,18 18-47,-17-18 16,17 17-16,0 1 15,0 0-15,0-1 0,17 1 16,1 17 0,0-17-16,-1 0 15,-17-1 1,0-34-1,0-1-15,-17 0 16,17-35 0,-18 36-16,18-19 15,0 1-15,0 0 0,18 17 0,-18-17 16,17 35-16,1-18 16,0 18-16,-1 18 15,-17 0-15,18 34 16,0-34-1,-18 0-15</inkml:trace>
   <inkml:trace contextRef="#ctx0" brushRef="#br1" timeOffset="406419.3415">5062 15346 0,'0'0'0,"0"35"16,0-17-16,18 35 15,0-36 1,-1 1 0,-17-36-1</inkml:trace>
-  <inkml:trace contextRef="#ctx0" brushRef="#br1" timeOffset="406541.0668">5027 15240 0,'0'-18'16,"18"18"-16,-1 0 16,1 0-16,0 0 15</inkml:trace>
+  <inkml:trace contextRef="#ctx0" brushRef="#br1" timeOffset="406541.0667">5027 15240 0,'0'-18'16,"18"18"-16,-1 0 16,1 0-16,0 0 15</inkml:trace>
   <inkml:trace contextRef="#ctx0" brushRef="#br1" timeOffset="406723.7954">5239 15311 0,'-18'35'15,"36"-70"-15,-36 87 0,18-34 0,0 0 16,18 17-16,-1-35 16,1 18-16,0-1 0,17-17 15,-17 0-15,-1 0 16</inkml:trace>
   <inkml:trace contextRef="#ctx0" brushRef="#br1" timeOffset="406913.5263">5362 15258 0,'18'0'15,"0"0"-15,-1 0 16,18 0-16,-17 0 15,17 0 1,-17 0-16,-18-18 0</inkml:trace>
   <inkml:trace contextRef="#ctx0" brushRef="#br1" timeOffset="407074.9947">5450 15011 0,'18'70'16,"-18"-17"-16,0-18 0,18 18 15,-18 0-15,17-17 0,-17 16 16,18-16-16,0-1 16,-1-17-16</inkml:trace>
-  <inkml:trace contextRef="#ctx0" brushRef="#br1" timeOffset="407202.3413">5627 15293 0,'0'0'0,"17"18"0,-17 34 16,18-52-16</inkml:trace>
+  <inkml:trace contextRef="#ctx0" brushRef="#br1" timeOffset="407202.3412">5627 15293 0,'0'0'0,"17"18"0,-17 34 16,18-52-16</inkml:trace>
   <inkml:trace contextRef="#ctx0" brushRef="#br1" timeOffset="407353.0166">5627 15169 0,'17'0'16,"-34"0"-16,52 0 15,0 18 1</inkml:trace>
   <inkml:trace contextRef="#ctx0" brushRef="#br1" timeOffset="407608.9065">5803 15293 0,'0'0'16,"0"35"-16,18-35 15,-18 18-15,17-1 16,1 1-16,0-18 0,-1 0 15,1-18 1,-18-17 0,0 18-16,-18 17 15,18-18-15,-17 0 16,-1-17-16,0 35 16,18-18-1,18 18 1</inkml:trace>
   <inkml:trace contextRef="#ctx0" brushRef="#br1" timeOffset="407808.2856">6015 15311 0,'0'0'16,"0"-18"15,18 0-16,-1 1-15,1-1 0,-1 18 16,1 0-16,0 0 16,-1 0-1,1 18-15,-18 17 0,18 18 16</inkml:trace>
@@ -496,23 +492,23 @@
   <inkml:trace contextRef="#ctx0" brushRef="#br0" timeOffset="23528.265">26035 18009 0,'0'0'0,"-18"0"0,1-17 15,-1 17-15,-17 0 0,-18 17 16,35 1-16,1 0 15,-19 17-15,36 18 16,0-36-16,18 19 16,0-19-16,35-17 15,-36 0-15,36 0 16,-35-17-16,35-19 16,-53 19-16,17-1 15,-17 1 1,0 34-1,18 36-15,-18 0 16,18 53-16,-1-71 16,1 18-16,-1-18 0,-17 1 15,18-1-15,-18-18 0,0 19 16,-18-36 0,1 0-1,-1-18-15,-17-35 16,35 18-16,-18 0 15,18-18-15,0-53 16</inkml:trace>
   <inkml:trace contextRef="#ctx0" brushRef="#br0" timeOffset="23821.5802">26370 18292 0,'0'0'16,"-17"-18"-16,-1 18 0,0-18 16,1 1-16,17-19 15,0 19-15,-18-19 16,18 19 0,0-18-16,0 17 15,0 0-15,18 18 31,17 0-15,-17 18-16,34-18 16,-34 0-1,17 0-15</inkml:trace>
   <inkml:trace contextRef="#ctx0" brushRef="#br0" timeOffset="24824.7283">26617 18062 0,'-35'0'15,"17"18"-15,-17 0 16,35-1-16,-18 1 16,18 17-16,0-17 0,18 35 15,-18-36-15,53 19 16,-36-36-16,36 0 15,-35 0-15,0-18 16,-1-17-16,-17 17 16,0-35-16,0 35 15,0-34 1,-17 34-16,-1 0 16,0 36-16,18 0 15,18 17-15,-18-18 16,18 19-16,-1-19 0,1 1 15,35 17 1,-36-35-16,36 0 16,-35 0-16,0 0 15,-1-17-15,1-1 0,-18 0 16,0 1 0,-18-1-16,-17 18 15,35 18 1,-18 17-1,36 0 1,-18-17-16,18-18 0,17 0 16,18-18-1,-35 18-15,-1-17 0,1-36 16,-18 17-16,0-34 16,0 35-16,0-18 15,-35-53-15,17 53 16,-17-71-16,-1 89 15,19 0 1,-1 17-16,0 18 0,1 36 16,-1-19-16,18 71 15,18-17-15,-1 52 16,19-70-16,17 71 16,-36-89-16,36 36 15,-18-54-15,-17 1 16,0 0-16,-1-18 15,-17-18 1,18 0 0,-18 1-16,0-1 15,18 18-15,-1 0 32,1 0-17,-18-18-15,0 1 16,0-19-16,0 19 15,0-1 1,-18 1-16,36 17 31</inkml:trace>
-  <inkml:trace contextRef="#ctx0" brushRef="#br0" timeOffset="25196.8505">27217 18239 0,'0'0'16,"0"17"-16,17-17 16,1 0-1,0 0-15,-1-17 0,19-19 16,-36 19-16,0-19 16,0 19-16,-18-1 15,18 1-15,-18 17 16,1 0-16,-1 17 0,0-17 15,18 35 1,0-17-16,0 17 16,18-17-16,17 0 15,-17-18-15,17 17 16,-17-17-16,0-17 16,-1-1 15,1 36-16,-1-18 1,1 17 0,0-17-1,-1 0-15,1 0 16</inkml:trace>
+  <inkml:trace contextRef="#ctx0" brushRef="#br0" timeOffset="25196.8504">27217 18239 0,'0'0'16,"0"17"-16,17-17 16,1 0-1,0 0-15,-1-17 0,19-19 16,-36 19-16,0-19 16,0 19-16,-18-1 15,18 1-15,-18 17 16,1 0-16,-1 17 0,0-17 15,18 35 1,0-17-16,0 17 16,18-17-16,17 0 15,-17-18-15,17 17 16,-17-17-16,0-17 16,-1-1 15,1 36-16,-1-18 1,1 17 0,0-17-1,-1 0-15,1 0 16</inkml:trace>
   <inkml:trace contextRef="#ctx0" brushRef="#br0" timeOffset="25363.7238">27481 18080 0,'0'-18'16,"18"18"-16,17 18 16,-17-18-16,35 0 15,-18 0-15,18 0 16,-35 0-16,17-18 16,-35 1-16,0-1 15</inkml:trace>
   <inkml:trace contextRef="#ctx0" brushRef="#br0" timeOffset="25513.7243">27693 17903 0,'0'0'0,"0"71"16,0-36-16,-18 1 16,18 52-16,0-53 15,18 36-15,0-54 16,-1 19-1</inkml:trace>
   <inkml:trace contextRef="#ctx0" brushRef="#br0" timeOffset="25798.3979">27746 18080 0,'-18'35'16,"36"-70"-16,-53 88 0,35-36 16,53 36-16,-18-35 0,35 0 15,-34-1 1,34 1-16,-52 0 16,0-1-16,-18 1 15,-36-1 1,1 1-16,17-18 0,-17 18 15,-18-18-15,18 0 16,0 0-16,-1-18 16</inkml:trace>
   <inkml:trace contextRef="#ctx0" brushRef="#br0" timeOffset="26972.0518">27834 18221 0,'18'0'46,"-1"-18"-30,1 1 0,35-1-16,-35 0 15,35-34-15,-36 34 16,1 0-16,-1 1 0,-17-1 16</inkml:trace>
-  <inkml:trace contextRef="#ctx0" brushRef="#br0" timeOffset="47080.5111">22366 11871 0,'-18'-35'0,"36"70"0,-36-88 16,18 18-1,18 17-15,0 36 16,-18-1-16,35 89 15,-17-35 1,-1 17-16,1-17 0,0 17 16,-1 0-16,19-17 0,-19-1 15,1-17-15,17 18 16,-17-54-16,17-17 16,-35-17-16,35-36 15,-17 0-15,-18-53 16,0 35-16,-18-52 15,18 52-15,-17-17 16,-1 53-16,0 17 16,1 18-16,-1 35 15,0 1-15,1-1 16</inkml:trace>
+  <inkml:trace contextRef="#ctx0" brushRef="#br0" timeOffset="47080.511">22366 11871 0,'-18'-35'0,"36"70"0,-36-88 16,18 18-1,18 17-15,0 36 16,-18-1-16,35 89 15,-17-35 1,-1 17-16,1-17 0,0 17 16,-1 0-16,19-17 0,-19-1 15,1-17-15,17 18 16,-17-54-16,17-17 16,-35-17-16,35-36 15,-17 0-15,-18-53 16,0 35-16,-18-52 15,18 52-15,-17-17 16,-1 53-16,0 17 16,1 18-16,-1 35 15,0 1-15,1-1 16</inkml:trace>
   <inkml:trace contextRef="#ctx0" brushRef="#br0" timeOffset="47491.4235">22913 12418 0,'0'0'0,"-35"-18"0,17 18 15,-17 35-15,17-17 16,18 0-16,-18 17 15,18 0-15,0 1 0,0-1 16,18-18-16,0 1 16,17-18-16,0 0 15,1-35-15,-19 17 16,1 1-16,-18-19 16,17-34-16,-17 34 0,-35-52 15,35 53 1,-35 0-16,17 35 15,1-18-15,17 36 16,-18 35 0,18-18-16,18 53 15,-1-53-15,19 36 16,-1-36-16,18 18 16,-18-35-16,18 17 15,-35-35-15</inkml:trace>
   <inkml:trace contextRef="#ctx0" brushRef="#br0" timeOffset="47891.4622">23160 12330 0,'18'35'15,"-18"0"-15,0 36 16,17-18-16,1-18 15,17 35-15,-17-34 16,-1 17-16,1-53 16,0 17-1,-1-34-15,-17-1 16,0 0-16,0-35 16,0 36-16,0-1 15,18 18 1,0 0-16,-18 18 15,17-1-15,1 1 0,-1 0 16,36-1-16,-17-17 16,-19 0-16,1 0 0,35 0 15,-53-17-15,17-19 16,-34 19 0,-1-54-16,1 54 15,-36-36-15,35 35 16,-17-17-16</inkml:trace>
-  <inkml:trace contextRef="#ctx0" brushRef="#br0" timeOffset="49399.2697">21855 13141 0,'0'0'0,"-18"0"0,36 0 16,35 0-1,-1 0-15,107-18 16,-53 18-16,17-17 16,195-1-16,-159 18 15,211-35 1,-176 17-16,0 18 0,0-17 16,0-1-16,-17 18 0,-19-18 15,-34 1-15,52 17 16,-140 0-16,-36 0 15,-18 0-15</inkml:trace>
+  <inkml:trace contextRef="#ctx0" brushRef="#br0" timeOffset="49399.2696">21855 13141 0,'0'0'0,"-18"0"0,36 0 16,35 0-1,-1 0-15,107-18 16,-53 18-16,17-17 16,195-1-16,-159 18 15,211-35 1,-176 17-16,0 18 0,0-17 16,0-1-16,-17 18 0,-19-18 15,-34 1-15,52 17 16,-140 0-16,-36 0 15,-18 0-15</inkml:trace>
   <inkml:trace contextRef="#ctx0" brushRef="#br0" timeOffset="49811.8287">22507 13388 0,'18'18'16,"-36"-36"-16,36 53 0,0 36 15,-1-18-15,-17 88 16,0-71-16,0 54 15,0-71-15,18-18 16,-1 36-16,1-54 16,-18 1-16,18-18 15</inkml:trace>
-  <inkml:trace contextRef="#ctx0" brushRef="#br0" timeOffset="49973.143">22842 13723 0,'36'0'16,"-19"0"-16,71-18 15,-52 18-15,-1 0 0,18 0 16,-35 0-16,-1 0 16</inkml:trace>
+  <inkml:trace contextRef="#ctx0" brushRef="#br0" timeOffset="49973.1429">22842 13723 0,'36'0'16,"-19"0"-16,71-18 15,-52 18-15,-1 0 0,18 0 16,-35 0-16,-1 0 16</inkml:trace>
   <inkml:trace contextRef="#ctx0" brushRef="#br0" timeOffset="50728.5902">23389 14517 0,'0'0'0,"0"35"15,0-53 1,0-52-1,0 35-15,18-36 16,-18-52-16,0 52 16,35-88-16,-35 71 15,35-88-15,-17 105 16,17-35 0,-17 71-16,0 35 0,17-18 15,-18 18 1,1 36-16,0-19 15,-18 36 1,-18-17-16,0-1 16,1 0-16,17 0 15,-18 18-15,18-35 16,0 35-16,18-36 16,-1 36-1,1-35-15,0 0 16,-18-1-16,0 1 15,0 0-15,-18-18 16,0 0-16,1 0 16,-1-18-1,1 0-15,-1 18 16,0 0-16,1 18 16</inkml:trace>
-  <inkml:trace contextRef="#ctx0" brushRef="#br0" timeOffset="50995.6194">23830 13441 0,'18'0'16,"-1"0"-16,1 17 15,35-17-15,-18 0 16,36 0 0,-54 0-16,1 0 0,0-17 15,-18-1-15</inkml:trace>
+  <inkml:trace contextRef="#ctx0" brushRef="#br0" timeOffset="50995.6193">23830 13441 0,'18'0'16,"-1"0"-16,1 17 15,35-17-15,-18 0 16,36 0 0,-54 0-16,1 0 0,0-17 15,-18-1-15</inkml:trace>
   <inkml:trace contextRef="#ctx0" brushRef="#br0" timeOffset="51229.6435">23971 13264 0,'18'0'0,"-18"36"16,-18-19-16,18 19 15,-17-1-15,17 53 16,0-35-16,0-18 0,0 36 16,0-36-16,53 0 15,-18-35 1,0 0-16,-17 0 0,17-17 16,0-1-16,-17 1 15</inkml:trace>
   <inkml:trace contextRef="#ctx0" brushRef="#br0" timeOffset="67651.7723">21749 12030 0,'-18'-18'15,"36"36"1,-1-18 0,19 17-16,52 54 15,53 35 1,-35-53-16,-18 17 0,265 212 15,-106-70 1,-106-88-16,-18-1 0,124 124 16,0-18-1,-123-123-15,87 71 16,-105-89-16,0-35 16,-35 17-16,-1-35 0,-17 18 15,18 0-15,-54-53 16,1 18-1,-18-36-15,0 1 16</inkml:trace>
   <inkml:trace contextRef="#ctx0" brushRef="#br0" timeOffset="68097.0993">23936 11783 0,'0'0'16,"-53"70"-16,18 1 0,-18 17 0,-71 141 15,36-87-15,-106 193 16,88-159-16,-17 36 15,-124 211 1,123-211-16,19-18 0,-89 141 16,123-212-16,-17 54 15,70-142-15,18 0 16,-17-17-16,17 0 0,17-18 16</inkml:trace>
-  <inkml:trace contextRef="#ctx0" brushRef="#br0" timeOffset="76710.7915">1094 2734 0,'0'0'16,"0"-18"-16,0 1 0,17 17 31,19 53-16,-19-18-15,1 18 16,-1 17-16,1 1 0,35 88 16,-35-106-16,17 52 15,-17-69-15,-18-19 16,17 1-16,1-36 16,-18-52-1,17 17 1,-17-53-16,0 36 0,0-54 15,0 89-15,0-36 16,0 54 0,0-1-16,0 36 15,0-1-15,0 19 16,0-1-16</inkml:trace>
+  <inkml:trace contextRef="#ctx0" brushRef="#br0" timeOffset="76710.7914">1094 2734 0,'0'0'16,"0"-18"-16,0 1 0,17 17 31,19 53-16,-19-18-15,1 18 16,-1 17-16,1 1 0,35 88 16,-35-106-16,17 52 15,-17-69-15,-18-19 16,17 1-16,1-36 16,-18-52-1,17 17 1,-17-53-16,0 36 0,0-54 15,0 89-15,0-36 16,0 54 0,0-1-16,0 36 15,0-1-15,0 19 16,0-1-16</inkml:trace>
   <inkml:trace contextRef="#ctx0" brushRef="#br0" timeOffset="77261.1476">1764 3298 0,'0'-17'15,"-18"17"-15,18-18 0,-35 1 16,17-1 0,-17 18-1,17 18-15,-17 17 16,35-18-16,-17 1 15,17 35-15,0-35 16,0-1-16,17-17 0,1 18 16,-1-18-16,1-18 15,0 18-15,-1-35 16,19 0-16,-19-1 16,-17 1-16,0-35 15,0 34-15,0 1 16,-17 0-16,-1 0 0,18-1 15,-18 19-15,1-1 0,-1 18 16,18 71 0,0-36-16,0 18 15,0 0-15,35 35 16,-17-53-16,0 0 16,-1-17-16,1 0 0,17-1 15,-17 1-15,35 0 16,-36-18-16</inkml:trace>
   <inkml:trace contextRef="#ctx0" brushRef="#br0" timeOffset="77918.0767">1940 3175 0,'0'-18'31,"18"1"-15,-36 17 31,18 17 0,0 1-32,0 0-15,18 52 16,-18-52-16,18 52 15,-18-52 1,17 17-16,-17-17 16,18-18-16,-1 0 15,1-35 1,-18 17-16,18-17 16,-18-1-1,17 19-15,-17 34 31,36 19-15,-36-19-16,53 19 16,-36-19-16,1-17 0,0 0 15,17 0-15,-18-17 16,1-1-16,0 0 16,-18 1-16,-18-36 15,0 35-15,-17-35 16,18 53-16,-1-17 15,0 17-15,36 0 16</inkml:trace>
   <inkml:trace contextRef="#ctx0" brushRef="#br0" timeOffset="78122.5613">2558 2963 0,'0'0'0,"17"-17"15,19 17 1,-19 0-16,1 0 16,-1 0-16,19 0 0,-1 17 15</inkml:trace>
@@ -539,7 +535,7 @@
   <inkml:trace contextRef="#ctx0" brushRef="#br1" timeOffset="133723.9357">19879 7938 0,'35'0'15,"-70"0"-15,106 0 0,-54 0 0,54-36 16,-36 36-16,-17-17 16,-1 17-16</inkml:trace>
   <inkml:trace contextRef="#ctx0" brushRef="#br1" timeOffset="134397.2117">20726 8643 0,'0'35'15,"0"-70"-15,0 53 16,0-36-1,0 0-15,-18-34 0,18-1 16,-18 0-16,-34-88 16,34 70-16,-17-17 15,-1-18-15,19 0 0,-36-106 16,53 124-16,0 0 0,0 35 16,70-17-16,19 17 15,-37 53-15,1 0 16,53 35-1,-71 0-15,-17 1 0,0-1 16,-1 18-16,-17 0 0,-17 17 16,-19-35-16,1 1 15,0-1-15,-36 18 16,36-53-16,17 18 16,1-18-16,17 17 0,17-17 15,19-17 1,17-1-1,-36 18-15</inkml:trace>
   <inkml:trace contextRef="#ctx0" brushRef="#br1" timeOffset="134474.7873">20779 7938 0,'-36'35'15,"72"-70"-15,-72 87 0,19-52 16,-1 18-16,0 0 16</inkml:trace>
-  <inkml:trace contextRef="#ctx0" brushRef="#br1" timeOffset="134863.7846">20779 7938 0,'0'0'0,"-71"0"16,53-18 0,1 0-16,17 1 15,17 17-15,1 0 16,17 0-16,1 17 0,34 1 16,-35 0-16,36 17 15,-36-18-15,1 36 16,-36-35-16,-36 35 15,1-18 1,-36 0-16,19-35 16,-37 18-16,54-18 15,-18 0-15,36-18 16,17 1-16,17 17 16,1 0-1,17 0-15</inkml:trace>
+  <inkml:trace contextRef="#ctx0" brushRef="#br1" timeOffset="134863.7845">20779 7938 0,'0'0'0,"-71"0"16,53-18 0,1 0-16,17 1 15,17 17-15,1 0 16,17 0-16,1 17 0,34 1 16,-35 0-16,36 17 15,-36-18-15,1 36 16,-36-35-16,-36 35 15,1-18 1,-36 0-16,19-35 16,-37 18-16,54-18 15,-18 0-15,36-18 16,17 1-16,17 17 16,1 0-1,17 0-15</inkml:trace>
   <inkml:trace contextRef="#ctx0" brushRef="#br1" timeOffset="135332.2036">21396 7708 0,'18'18'16,"-1"52"0,-17-34-16,36 52 15,-19-35-15,1 0 0,17 35 16,-17-53-16,-1 0 16,1-17-16,0 0 15,-18-36-15,17-17 16,-17-18-16,0-35 15,-17 52 1,17-52-16,-18 53 16,18 0-16,0 17 15,0 53 1</inkml:trace>
   <inkml:trace contextRef="#ctx0" brushRef="#br1" timeOffset="135771.2798">21855 8096 0,'0'-17'16,"0"34"-16,-18-34 0,0 17 0,1 17 15,-1 1 1,0 52-16,18-52 16,0 17-16,18 1 15,0-19-15,17 1 16,-17-18-16,-1-18 0,1-17 16,0 17-1,-18-17-15,17 17 0,-17-17 16,0 0-16,-17 0 0,-1-18 15,18 17-15,-18 19 16,1 17 0,17 35-1,0 18-15,0 18 16,17-36-16,1-18 16,17 54-1,0-36-15,-17-17 0,0 0 16,17-1-1</inkml:trace>
   <inkml:trace contextRef="#ctx0" brushRef="#br1" timeOffset="136143.1077">22102 8132 0,'0'17'31,"0"1"-16,0-1-15,0 19 16,0-19-16,17 19 16,-17-19-16,35 1 15,-17-18 1,0-18-16,-1 18 16,-17-17-16,18 17 0,0 0 15,-18 17 1,17 1-16,-17 0 15,18-18-15,17 17 16,-17 1-16,17-18 16,-17-18-16,-1 1 0,-17-1 15,18-35 1,-18 18-16,-18-18 16,18 18-16,-17-18 15,17 35-15,0 0 16,0 1-16,17 17 15</inkml:trace>
@@ -552,7 +548,7 @@
   <inkml:trace contextRef="#ctx0" brushRef="#br1" timeOffset="150602.7213">18521 8661 0,'17'0'31,"19"0"-31,17 0 16,0 0-16,35 0 0,106 0 16,-71-18-16,107 0 15,-142 18-15,0 0 16,-17 0-16,-19 0 0,1 18 16,-35-18-16</inkml:trace>
   <inkml:trace contextRef="#ctx0" brushRef="#br1" timeOffset="157859.2241">8043 12294 0,'-17'18'15,"34"-36"-15,-34 54 0,-1-19 0,18 19 16,0-1-1,18 0-15,-1-17 0,1-1 16,0 1-16,35 0 16,-18-18-16,18 17 15,0-17-15,70 0 0,-52 0 16,87-17 0,-69-1-16,-1 0 0,0 18 15,0-17-15,71 17 16,-106 0-16,17 17 0,-34-17 15,34 53 1,-34-35-16,-19 17 0,1 0 16,-18-17-16,17-18 47,19-35-47,-1 0 15,36-1-15,-19 19 16,37-1-1,-36 18-15,52 0 16,-52 18-16,71-1 16,-71-17-16,53 18 15,-71-18-15,0-18 16,0 18-16,1 0 0,-1-17 16,-17 17-16</inkml:trace>
   <inkml:trace contextRef="#ctx0" brushRef="#br1" timeOffset="158704.5351">15787 12171 0,'17'0'0,"-34"0"16,34 17-1,-17 19 1,18-1 0,-18-17-16,35 17 0,18 18 15,-35-18-15,70-17 16,-35-18-16,71 0 16,-54 0-1,1 0-15,-18-18 0,17 1 16,-17 17-16,53-18 15,-71 36-15,0-18 0,-17 17 16,0 18-16,-1 1 16,1-1-16,-18-17 15,18-1-15,-18 19 0,17-19 16,19-17-16,-1 0 16,18-17-16,53-19 15,-36 19-15,71-1 16,-70 0-16,70 18 15,-71 0-15,72 18 16,-72-18 0,18 0-16,-70 0 15,0 18-15,-54-18 16</inkml:trace>
-  <inkml:trace contextRef="#ctx0" brushRef="#br1" timeOffset="159722.38">11483 15857 0,'18'-53'16,"-1"18"-16,36-53 15,-18 17-15,1 1 16,17-1-16,-18 18 0,18 0 16,0-35-16,-36 53 15,1 17-15,-18 36 16,-18 0 0</inkml:trace>
+  <inkml:trace contextRef="#ctx0" brushRef="#br1" timeOffset="159722.3799">11483 15857 0,'18'-53'16,"-1"18"-16,36-53 15,-18 17-15,1 1 16,17-1-16,-18 18 0,18 0 16,0-35-16,-36 53 15,1 17-15,-18 36 16,-18 0 0</inkml:trace>
   <inkml:trace contextRef="#ctx0" brushRef="#br1" timeOffset="160023.2778">11359 15469 0,'0'18'15,"0"53"1,0-36-16,18 53 16,0-17-16,-18-19 0,0-16 15,17-1-15,-17 0 0,18-17 16,35-18 0,-18 0-16,53-18 15,-35 1-15,36-19 16,-54 19-16,0 17 0,-17-18 15,-1 18-15</inkml:trace>
   <inkml:trace contextRef="#ctx0" brushRef="#br1" timeOffset="186588.8099">18486 8961 0,'17'0'31,"-17"17"-15,0 1-16,18-1 15,17 19 1,-17-19-16,17 1 0,0 0 15,18 17-15,0-17 0,0-1 16,18 1-16,105 0 16,-70-1-16,123 1 15,-105-18-15,-1-18 16,18 1-16,18-1 0,0 0 16,-1 1-16,160-19 15,-159 19-15,123-1 16,-141 0-16,124 18 15,-142 0-15,89 0 16,-124 0-16,0 18 16,0-18-16,-17 18 0,-18-1 15,0 1-15,0 0 0,0-1 16,-1 19-16,-16-19 16,-1 18-1,-17-17-15,-18 0 0,0-1 16,-18-17-16,36 0 31,17-53-31,-17 36 16,17-1-16,0-17 0,0 17 15,36-52 1,-18 52-16,53-35 16,-53 35-16,52-17 15,-52 35-15,53-17 16,-35-1-16,-1 18 15,1 0-15,-1 0 0,89 0 16,-53 0-16,88 18 16,-88-18-16,141 17 15,-124 1-15,18-18 16,142 35-16,-142-17 16,0-18-16,141 17 15,-123-17-15,123 0 16,-123 0-16,-18-17 15,159-19-15,-159 19 16,123-36 0,-175 18-16,69-36 15,-122 53-15,-19-52 16,-34 52-16,-54 18 16</inkml:trace>
   <inkml:trace contextRef="#ctx0" brushRef="#br1" timeOffset="193200.272">20955 8925 0,'-18'-17'16,"18"-1"-1,0 36 1,0 35-16,0-18 16,18 18-16,17 176 15,-17-53 1,-18 18-1,35-52-15,-17-72 16,17 18-16,-17-35 16,-1-35-1,-17-36 1</inkml:trace>
@@ -651,7 +647,7 @@
           <a:p>
             <a:fld id="{7627361B-9EE3-994B-868D-94E57ECC4CDF}" type="datetimeFigureOut">
               <a:rPr lang="en-US" smtClean="0"/>
-              <a:t>7/23/2017</a:t>
+              <a:t>12/21/2018</a:t>
             </a:fld>
             <a:endParaRPr lang="en-US"/>
           </a:p>
@@ -1047,7 +1043,7 @@
           <a:p>
             <a:fld id="{456513CB-B5C6-794C-B9FC-914286F7D4D4}" type="datetimeFigureOut">
               <a:rPr lang="en-US" smtClean="0"/>
-              <a:t>7/23/2017</a:t>
+              <a:t>12/21/2018</a:t>
             </a:fld>
             <a:endParaRPr lang="en-US"/>
           </a:p>
@@ -1215,7 +1211,7 @@
           <a:p>
             <a:fld id="{456513CB-B5C6-794C-B9FC-914286F7D4D4}" type="datetimeFigureOut">
               <a:rPr lang="en-US" smtClean="0"/>
-              <a:t>7/23/2017</a:t>
+              <a:t>12/21/2018</a:t>
             </a:fld>
             <a:endParaRPr lang="en-US"/>
           </a:p>
@@ -1393,7 +1389,7 @@
           <a:p>
             <a:fld id="{456513CB-B5C6-794C-B9FC-914286F7D4D4}" type="datetimeFigureOut">
               <a:rPr lang="en-US" smtClean="0"/>
-              <a:t>7/23/2017</a:t>
+              <a:t>12/21/2018</a:t>
             </a:fld>
             <a:endParaRPr lang="en-US"/>
           </a:p>
@@ -1574,7 +1570,7 @@
           <a:p>
             <a:fld id="{456513CB-B5C6-794C-B9FC-914286F7D4D4}" type="datetimeFigureOut">
               <a:rPr lang="en-US" smtClean="0"/>
-              <a:t>7/23/2017</a:t>
+              <a:t>12/21/2018</a:t>
             </a:fld>
             <a:endParaRPr lang="en-US"/>
           </a:p>
@@ -1848,7 +1844,7 @@
           <a:p>
             <a:fld id="{456513CB-B5C6-794C-B9FC-914286F7D4D4}" type="datetimeFigureOut">
               <a:rPr lang="en-US" smtClean="0"/>
-              <a:t>7/23/2017</a:t>
+              <a:t>12/21/2018</a:t>
             </a:fld>
             <a:endParaRPr lang="en-US"/>
           </a:p>
@@ -2077,7 +2073,7 @@
           <a:p>
             <a:fld id="{456513CB-B5C6-794C-B9FC-914286F7D4D4}" type="datetimeFigureOut">
               <a:rPr lang="en-US" smtClean="0"/>
-              <a:t>7/23/2017</a:t>
+              <a:t>12/21/2018</a:t>
             </a:fld>
             <a:endParaRPr lang="en-US"/>
           </a:p>
@@ -2441,7 +2437,7 @@
           <a:p>
             <a:fld id="{456513CB-B5C6-794C-B9FC-914286F7D4D4}" type="datetimeFigureOut">
               <a:rPr lang="en-US" smtClean="0"/>
-              <a:t>7/23/2017</a:t>
+              <a:t>12/21/2018</a:t>
             </a:fld>
             <a:endParaRPr lang="en-US"/>
           </a:p>
@@ -2558,7 +2554,7 @@
           <a:p>
             <a:fld id="{456513CB-B5C6-794C-B9FC-914286F7D4D4}" type="datetimeFigureOut">
               <a:rPr lang="en-US" smtClean="0"/>
-              <a:t>7/23/2017</a:t>
+              <a:t>12/21/2018</a:t>
             </a:fld>
             <a:endParaRPr lang="en-US"/>
           </a:p>
@@ -2653,7 +2649,7 @@
           <a:p>
             <a:fld id="{456513CB-B5C6-794C-B9FC-914286F7D4D4}" type="datetimeFigureOut">
               <a:rPr lang="en-US" smtClean="0"/>
-              <a:t>7/23/2017</a:t>
+              <a:t>12/21/2018</a:t>
             </a:fld>
             <a:endParaRPr lang="en-US"/>
           </a:p>
@@ -2928,7 +2924,7 @@
           <a:p>
             <a:fld id="{456513CB-B5C6-794C-B9FC-914286F7D4D4}" type="datetimeFigureOut">
               <a:rPr lang="en-US" smtClean="0"/>
-              <a:t>7/23/2017</a:t>
+              <a:t>12/21/2018</a:t>
             </a:fld>
             <a:endParaRPr lang="en-US"/>
           </a:p>
@@ -3180,7 +3176,7 @@
           <a:p>
             <a:fld id="{456513CB-B5C6-794C-B9FC-914286F7D4D4}" type="datetimeFigureOut">
               <a:rPr lang="en-US" smtClean="0"/>
-              <a:t>7/23/2017</a:t>
+              <a:t>12/21/2018</a:t>
             </a:fld>
             <a:endParaRPr lang="en-US"/>
           </a:p>
@@ -3391,7 +3387,7 @@
           <a:p>
             <a:fld id="{456513CB-B5C6-794C-B9FC-914286F7D4D4}" type="datetimeFigureOut">
               <a:rPr lang="en-US" smtClean="0"/>
-              <a:t>7/23/2017</a:t>
+              <a:t>12/21/2018</a:t>
             </a:fld>
             <a:endParaRPr lang="en-US"/>
           </a:p>
@@ -4335,115 +4331,9 @@
           </a:p>
         </p:txBody>
       </p:sp>
-      <p:grpSp>
-        <p:nvGrpSpPr>
-          <p:cNvPr id="17" name="Group 16">
-            <a:extLst>
-              <a:ext uri="{FF2B5EF4-FFF2-40B4-BE49-F238E27FC236}">
-                <a16:creationId xmlns:a16="http://schemas.microsoft.com/office/drawing/2014/main" id="{94E5968C-CCF4-43FF-B85F-BE950CD4A528}"/>
-              </a:ext>
-            </a:extLst>
-          </p:cNvPr>
-          <p:cNvGrpSpPr/>
-          <p:nvPr/>
-        </p:nvGrpSpPr>
-        <p:grpSpPr>
-          <a:xfrm>
-            <a:off x="3952233" y="2949677"/>
-            <a:ext cx="3507684" cy="3185652"/>
-            <a:chOff x="349372" y="1061869"/>
-            <a:chExt cx="4467022" cy="4056916"/>
-          </a:xfrm>
-        </p:grpSpPr>
-        <p:pic>
-          <p:nvPicPr>
-            <p:cNvPr id="18" name="Picture 17">
-              <a:extLst>
-                <a:ext uri="{FF2B5EF4-FFF2-40B4-BE49-F238E27FC236}">
-                  <a16:creationId xmlns:a16="http://schemas.microsoft.com/office/drawing/2014/main" id="{DF45BF25-4467-43A0-A613-67A6CCF398DC}"/>
-                </a:ext>
-              </a:extLst>
-            </p:cNvPr>
-            <p:cNvPicPr>
-              <a:picLocks noChangeAspect="1"/>
-            </p:cNvPicPr>
-            <p:nvPr/>
-          </p:nvPicPr>
-          <p:blipFill>
-            <a:blip r:embed="rId2"/>
-            <a:stretch>
-              <a:fillRect/>
-            </a:stretch>
-          </p:blipFill>
-          <p:spPr>
-            <a:xfrm>
-              <a:off x="662643" y="1061869"/>
-              <a:ext cx="3840480" cy="3718639"/>
-            </a:xfrm>
-            <a:prstGeom prst="rect">
-              <a:avLst/>
-            </a:prstGeom>
-          </p:spPr>
-        </p:pic>
-        <p:sp>
-          <p:nvSpPr>
-            <p:cNvPr id="19" name="Title 1">
-              <a:extLst>
-                <a:ext uri="{FF2B5EF4-FFF2-40B4-BE49-F238E27FC236}">
-                  <a16:creationId xmlns:a16="http://schemas.microsoft.com/office/drawing/2014/main" id="{073FE5B0-2CAF-49A6-9789-5EEBF87010F8}"/>
-                </a:ext>
-              </a:extLst>
-            </p:cNvPr>
-            <p:cNvSpPr txBox="1">
-              <a:spLocks/>
-            </p:cNvSpPr>
-            <p:nvPr/>
-          </p:nvSpPr>
-          <p:spPr>
-            <a:xfrm>
-              <a:off x="349372" y="4313121"/>
-              <a:ext cx="4467022" cy="805664"/>
-            </a:xfrm>
-            <a:prstGeom prst="rect">
-              <a:avLst/>
-            </a:prstGeom>
-          </p:spPr>
-          <p:txBody>
-            <a:bodyPr vert="horz" lIns="91440" tIns="45720" rIns="91440" bIns="45720" rtlCol="0" anchor="b">
-              <a:noAutofit/>
-            </a:bodyPr>
-            <a:lstStyle>
-              <a:lvl1pPr algn="ctr" defTabSz="914400" rtl="0" eaLnBrk="1" latinLnBrk="0" hangingPunct="1">
-                <a:lnSpc>
-                  <a:spcPct val="90000"/>
-                </a:lnSpc>
-                <a:spcBef>
-                  <a:spcPct val="0"/>
-                </a:spcBef>
-                <a:buNone/>
-                <a:defRPr sz="6000" kern="1200">
-                  <a:solidFill>
-                    <a:schemeClr val="tx1"/>
-                  </a:solidFill>
-                  <a:latin typeface="+mj-lt"/>
-                  <a:ea typeface="+mj-ea"/>
-                  <a:cs typeface="+mj-cs"/>
-                </a:defRPr>
-              </a:lvl1pPr>
-            </a:lstStyle>
-            <a:p>
-              <a:r>
-                <a:rPr lang="en-US" sz="3200" b="1" dirty="0"/>
-                <a:t>deeplearning.ai</a:t>
-              </a:r>
-              <a:endParaRPr lang="en-US" sz="3600" b="1" dirty="0"/>
-            </a:p>
-          </p:txBody>
-        </p:sp>
-      </p:grpSp>
-      <mc:AlternateContent xmlns:mc="http://schemas.openxmlformats.org/markup-compatibility/2006">
-        <mc:Choice xmlns:p14="http://schemas.microsoft.com/office/powerpoint/2010/main" Requires="p14">
-          <p:contentPart p14:bwMode="auto" r:id="rId3">
+      <mc:AlternateContent xmlns:mc="http://schemas.openxmlformats.org/markup-compatibility/2006" xmlns:p14="http://schemas.microsoft.com/office/powerpoint/2010/main">
+        <mc:Choice Requires="p14">
+          <p:contentPart p14:bwMode="auto" r:id="rId2">
             <p14:nvContentPartPr>
               <p14:cNvPr id="4" name="Ink 3">
                 <a:extLst>
@@ -4461,7 +4351,7 @@
             </p14:xfrm>
           </p:contentPart>
         </mc:Choice>
-        <mc:Fallback>
+        <mc:Fallback xmlns="">
           <p:pic>
             <p:nvPicPr>
               <p:cNvPr id="4" name="Ink 3">
@@ -4502,126 +4392,6 @@
   <p:clrMapOvr>
     <a:masterClrMapping/>
   </p:clrMapOvr>
-  <p:timing>
-    <p:tnLst>
-      <p:par>
-        <p:cTn id="1" dur="indefinite" restart="never" nodeType="tmRoot">
-          <p:childTnLst>
-            <p:seq concurrent="1" nextAc="seek">
-              <p:cTn id="2" dur="indefinite" nodeType="mainSeq">
-                <p:childTnLst>
-                  <p:par>
-                    <p:cTn id="3" fill="hold">
-                      <p:stCondLst>
-                        <p:cond delay="indefinite"/>
-                      </p:stCondLst>
-                      <p:childTnLst>
-                        <p:par>
-                          <p:cTn id="4" fill="hold">
-                            <p:stCondLst>
-                              <p:cond delay="0"/>
-                            </p:stCondLst>
-                            <p:childTnLst>
-                              <p:par>
-                                <p:cTn id="5" presetID="1" presetClass="entr" presetSubtype="0" fill="hold" nodeType="clickEffect">
-                                  <p:stCondLst>
-                                    <p:cond delay="0"/>
-                                  </p:stCondLst>
-                                  <p:childTnLst>
-                                    <p:set>
-                                      <p:cBhvr>
-                                        <p:cTn id="6" dur="1" fill="hold">
-                                          <p:stCondLst>
-                                            <p:cond delay="0"/>
-                                          </p:stCondLst>
-                                        </p:cTn>
-                                        <p:tgtEl>
-                                          <p:spTgt spid="17"/>
-                                        </p:tgtEl>
-                                        <p:attrNameLst>
-                                          <p:attrName>style.visibility</p:attrName>
-                                        </p:attrNameLst>
-                                      </p:cBhvr>
-                                      <p:to>
-                                        <p:strVal val="visible"/>
-                                      </p:to>
-                                    </p:set>
-                                  </p:childTnLst>
-                                </p:cTn>
-                              </p:par>
-                            </p:childTnLst>
-                          </p:cTn>
-                        </p:par>
-                      </p:childTnLst>
-                    </p:cTn>
-                  </p:par>
-                  <p:par>
-                    <p:cTn id="7" fill="hold">
-                      <p:stCondLst>
-                        <p:cond delay="indefinite"/>
-                      </p:stCondLst>
-                      <p:childTnLst>
-                        <p:par>
-                          <p:cTn id="8" fill="hold">
-                            <p:stCondLst>
-                              <p:cond delay="0"/>
-                            </p:stCondLst>
-                            <p:childTnLst>
-                              <p:par>
-                                <p:cTn id="9" presetID="1" presetClass="exit" presetSubtype="0" fill="hold" nodeType="clickEffect">
-                                  <p:stCondLst>
-                                    <p:cond delay="0"/>
-                                  </p:stCondLst>
-                                  <p:childTnLst>
-                                    <p:set>
-                                      <p:cBhvr>
-                                        <p:cTn id="10" dur="1" fill="hold">
-                                          <p:stCondLst>
-                                            <p:cond delay="0"/>
-                                          </p:stCondLst>
-                                        </p:cTn>
-                                        <p:tgtEl>
-                                          <p:spTgt spid="17"/>
-                                        </p:tgtEl>
-                                        <p:attrNameLst>
-                                          <p:attrName>style.visibility</p:attrName>
-                                        </p:attrNameLst>
-                                      </p:cBhvr>
-                                      <p:to>
-                                        <p:strVal val="hidden"/>
-                                      </p:to>
-                                    </p:set>
-                                  </p:childTnLst>
-                                </p:cTn>
-                              </p:par>
-                            </p:childTnLst>
-                          </p:cTn>
-                        </p:par>
-                      </p:childTnLst>
-                    </p:cTn>
-                  </p:par>
-                </p:childTnLst>
-              </p:cTn>
-              <p:prevCondLst>
-                <p:cond evt="onPrev" delay="0">
-                  <p:tgtEl>
-                    <p:sldTgt/>
-                  </p:tgtEl>
-                </p:cond>
-              </p:prevCondLst>
-              <p:nextCondLst>
-                <p:cond evt="onNext" delay="0">
-                  <p:tgtEl>
-                    <p:sldTgt/>
-                  </p:tgtEl>
-                </p:cond>
-              </p:nextCondLst>
-            </p:seq>
-          </p:childTnLst>
-        </p:cTn>
-      </p:par>
-    </p:tnLst>
-  </p:timing>
 </p:sld>
 </file>
 
@@ -5274,8 +5044,8 @@
           </p:sp>
         </mc:Fallback>
       </mc:AlternateContent>
-      <mc:AlternateContent xmlns:mc="http://schemas.openxmlformats.org/markup-compatibility/2006">
-        <mc:Choice xmlns:a14="http://schemas.microsoft.com/office/drawing/2010/main" Requires="a14">
+      <mc:AlternateContent xmlns:mc="http://schemas.openxmlformats.org/markup-compatibility/2006" xmlns:a14="http://schemas.microsoft.com/office/drawing/2010/main">
+        <mc:Choice Requires="a14">
           <p:sp>
             <p:nvSpPr>
               <p:cNvPr id="23" name="TextBox 22"/>
@@ -5371,7 +5141,7 @@
             </p:txBody>
           </p:sp>
         </mc:Choice>
-        <mc:Fallback>
+        <mc:Fallback xmlns="">
           <p:sp>
             <p:nvSpPr>
               <p:cNvPr id="23" name="TextBox 22"/>
@@ -5410,8 +5180,8 @@
           </p:sp>
         </mc:Fallback>
       </mc:AlternateContent>
-      <mc:AlternateContent xmlns:mc="http://schemas.openxmlformats.org/markup-compatibility/2006">
-        <mc:Choice xmlns:a14="http://schemas.microsoft.com/office/drawing/2010/main" Requires="a14">
+      <mc:AlternateContent xmlns:mc="http://schemas.openxmlformats.org/markup-compatibility/2006" xmlns:a14="http://schemas.microsoft.com/office/drawing/2010/main">
+        <mc:Choice Requires="a14">
           <p:sp>
             <p:nvSpPr>
               <p:cNvPr id="6" name="TextBox 5"/>
@@ -5511,7 +5281,7 @@
             </p:txBody>
           </p:sp>
         </mc:Choice>
-        <mc:Fallback>
+        <mc:Fallback xmlns="">
           <p:sp>
             <p:nvSpPr>
               <p:cNvPr id="6" name="TextBox 5"/>
@@ -5781,8 +5551,8 @@
           </p:sp>
         </mc:Fallback>
       </mc:AlternateContent>
-      <mc:AlternateContent xmlns:mc="http://schemas.openxmlformats.org/markup-compatibility/2006">
-        <mc:Choice xmlns:p14="http://schemas.microsoft.com/office/powerpoint/2010/main" Requires="p14">
+      <mc:AlternateContent xmlns:mc="http://schemas.openxmlformats.org/markup-compatibility/2006" xmlns:p14="http://schemas.microsoft.com/office/powerpoint/2010/main">
+        <mc:Choice Requires="p14">
           <p:contentPart p14:bwMode="auto" r:id="rId10">
             <p14:nvContentPartPr>
               <p14:cNvPr id="3" name="Ink 2">
@@ -5801,7 +5571,7 @@
             </p14:xfrm>
           </p:contentPart>
         </mc:Choice>
-        <mc:Fallback>
+        <mc:Fallback xmlns="">
           <p:pic>
             <p:nvPicPr>
               <p:cNvPr id="3" name="Ink 2">

</xml_diff>